<commit_message>
feat: Update presentation materials and add comprehensive Q&A section for endoscopy and colonoscopy topics
</commit_message>
<xml_diff>
--- a/bmg/biyomedikal_sunum.pptx
+++ b/bmg/biyomedikal_sunum.pptx
@@ -16,6 +16,14 @@
     <p:sldId id="264" r:id="rId15"/>
     <p:sldId id="265" r:id="rId16"/>
     <p:sldId id="266" r:id="rId17"/>
+    <p:sldId id="267" r:id="rId18"/>
+    <p:sldId id="268" r:id="rId19"/>
+    <p:sldId id="269" r:id="rId20"/>
+    <p:sldId id="270" r:id="rId21"/>
+    <p:sldId id="271" r:id="rId22"/>
+    <p:sldId id="272" r:id="rId23"/>
+    <p:sldId id="273" r:id="rId24"/>
+    <p:sldId id="274" r:id="rId25"/>
   </p:sldIdLst>
   <p:sldSz cx="9144000" cy="6858000" type="screen4x3"/>
   <p:notesSz cx="6858000" cy="9144000"/>
@@ -3136,7 +3144,7 @@
               </a:defRPr>
             </a:pPr>
             <a:r>
-              <a:t>Slide 1: Giriş – Biyomedikal Mühendisliğinde Endoskopi ve Kolonoskopi</a:t>
+              <a:t>Slide 1: Endoskopi ve Kolonoskopi Nedir? (Kısa Tanım)</a:t>
             </a:r>
           </a:p>
         </p:txBody>
@@ -3174,22 +3182,22 @@
               </a:defRPr>
             </a:pPr>
             <a:r>
-              <a:t>Endoskopi ve kolonoskopi, gastrointestinal sistem başta olmak üzere iç organların ve vücut boşluklarının görüntülenmesinde kullanılan minimal invaziv tanı ve tedavi yöntemleridir. Bu tekniklerin başarısı, insan vücudu içinde yüksek hassasiyet, güvenlik ve etkinlikle çalışabilen sofistike cihazlara dayanır. Biyomedikal mühendisliği; bu cihazların konsept aşamasından klinik uygulamaya kadar olan tüm süreçlerinde – tasarım, malzeme seçimi, üretim, test, validasyon ve iyileştirme – merkezi bir rol oynar.</a:t>
-            </a:r>
-          </a:p>
-          <a:p>
-            <a:pPr>
-              <a:spcAft>
-                <a:spcPts val="400"/>
-              </a:spcAft>
-              <a:defRPr sz="1400">
-                <a:solidFill>
-                  <a:srgbClr val="DCDCDC"/>
-                </a:solidFill>
-              </a:defRPr>
-            </a:pPr>
-            <a:r>
-              <a:t>Endoskopi genel bir terim olup, kullanıldığı bölgeye göre (örneğin, gastroskopi, bronkoskopi) isimlendirilirken; kolonoskopi, özellikle kalın bağırsağın (kolon) detaylı incelenmesi için tasarlanmış özel bir endoskopik prosedürdür. Her iki yöntemde kullanılan cihazlar; minyatür yüksek çözünürlüklü kameralar (genellikle CMOS veya CCD sensörler), esnek fiber optik veya LED tabanlı aydınlatma sistemleri, aletlerin (biyopsi forsepsi, polipektomi snare'i vb.) geçişine izin veren çalışma kanalları, insüflasyon (hava/CO2) ve irigasyon (su) için kanallar ve karmaşık veri/güç iletim modülleri gibi birçok ileri teknoloji bileşeni entegre eder. Bu sunum, bu teknolojilerin biyomedikal mühendisliği perspektifinden nasıl hayata geçirildiğini ve modern sağlık sistemine katkılarını ele alacaktır.</a:t>
+              <a:t>Endoskopi ve kolonoskopi, vücut içini minimal invaziv yöntemlerle görüntülemek için kullanılan temel tekniklerdir. Endoskopi genel bir terimken, kolonoskopi özellikle kalın bağırsağın incelenmesine odaklanır. Bu yöntemler, cerrahi kesi olmadan tanı ve bazen tedavi imkanı sunar. Başarıları, gelişmiş cihaz teknolojisine dayanır.</a:t>
+            </a:r>
+          </a:p>
+          <a:p>
+            <a:pPr>
+              <a:spcAft>
+                <a:spcPts val="400"/>
+              </a:spcAft>
+              <a:defRPr sz="1400">
+                <a:solidFill>
+                  <a:srgbClr val="DCDCDC"/>
+                </a:solidFill>
+              </a:defRPr>
+            </a:pPr>
+            <a:r>
+              <a:t>**Keywords:** Endoscopy, Colonoscopy, Minimally Invasive, Diagnosis, Gastrointestinal System.</a:t>
             </a:r>
           </a:p>
         </p:txBody>
@@ -3250,7 +3258,7 @@
               </a:defRPr>
             </a:pPr>
             <a:r>
-              <a:t>Slide 10: Kapanış – Mühendisliğin Sağlıkta Yeri</a:t>
+              <a:t>Slide 10: Yapay Zeka Entegrasyonunun Mühendislik Yönleri</a:t>
             </a:r>
           </a:p>
         </p:txBody>
@@ -3288,37 +3296,97 @@
               </a:defRPr>
             </a:pPr>
             <a:r>
-              <a:t>Biyomedikal mühendisliği, temel bilimsel keşifler ile klinik uygulama arasındaki köprüyü kurarak, insan sağlığını iyileştirmeye adanmış bir disiplindir. Endoskopik sistemler, bu misyonun somut bir örneğidir; mühendislik prensiplerinin nasıl daha doğru tanılar, daha az invaziv tedaviler ve sonuçta daha iyi hasta sonuçları sağladığını gösterir.</a:t>
-            </a:r>
-          </a:p>
-          <a:p>
-            <a:pPr>
-              <a:spcAft>
-                <a:spcPts val="400"/>
-              </a:spcAft>
-              <a:defRPr sz="1400">
-                <a:solidFill>
-                  <a:srgbClr val="DCDCDC"/>
-                </a:solidFill>
-              </a:defRPr>
-            </a:pPr>
-            <a:r>
-              <a:t>Bu alandaki ilerlemeler, sadece teknolojik yenilikler değil, aynı zamanda hasta bakım standartlarını yükselten ve sağlık hizmetlerini daha erişilebilir kılan önemli adımlardır.</a:t>
-            </a:r>
-          </a:p>
-          <a:p>
-            <a:pPr>
-              <a:spcAft>
-                <a:spcPts val="400"/>
-              </a:spcAft>
-              <a:defRPr sz="1400">
-                <a:solidFill>
-                  <a:srgbClr val="DCDCDC"/>
-                </a:solidFill>
-              </a:defRPr>
-            </a:pPr>
-            <a:r>
-              <a:t>Teşekkür ederim.</a:t>
+              <a:t>AI'yı endoskopiye entegre etmek önemli mühendislik görevleri içerir:</a:t>
+            </a:r>
+          </a:p>
+          <a:p>
+            <a:pPr>
+              <a:spcAft>
+                <a:spcPts val="400"/>
+              </a:spcAft>
+              <a:defRPr sz="1400">
+                <a:solidFill>
+                  <a:srgbClr val="DCDCDC"/>
+                </a:solidFill>
+              </a:defRPr>
+            </a:pPr>
+            <a:r>
+              <a:t>  • **Veri Yönetimi:** Büyük, yüksek kaliteli ve doğru etiketlenmiş veri setlerinin toplanması, saklanması ve yönetimi. Veri gizliliği ve güvenliği kritiktir.</a:t>
+            </a:r>
+          </a:p>
+          <a:p>
+            <a:pPr>
+              <a:spcAft>
+                <a:spcPts val="400"/>
+              </a:spcAft>
+              <a:defRPr sz="1400">
+                <a:solidFill>
+                  <a:srgbClr val="DCDCDC"/>
+                </a:solidFill>
+              </a:defRPr>
+            </a:pPr>
+            <a:r>
+              <a:t>  • **Algoritma Geliştirme ve Optimizasyon:** Farklı CNN mimarilerinin (örn. YOLO, ResNet, U-Net) denenmesi, modelin doğruluğu ve hızı (gerçek zamanlı işlem için &lt;30-50ms gecikme) arasında denge kurulması.</a:t>
+            </a:r>
+          </a:p>
+          <a:p>
+            <a:pPr>
+              <a:spcAft>
+                <a:spcPts val="400"/>
+              </a:spcAft>
+              <a:defRPr sz="1400">
+                <a:solidFill>
+                  <a:srgbClr val="DCDCDC"/>
+                </a:solidFill>
+              </a:defRPr>
+            </a:pPr>
+            <a:r>
+              <a:t>  • **Donanım Entegrasyonu:** AI algoritmalarını mevcut endoskopi işlemcilerinde veya harici ünitelerde (GPU hızlandırmalı) verimli bir şekilde çalıştırmak. Gecikmesiz video akışı işleme.</a:t>
+            </a:r>
+          </a:p>
+          <a:p>
+            <a:pPr>
+              <a:spcAft>
+                <a:spcPts val="400"/>
+              </a:spcAft>
+              <a:defRPr sz="1400">
+                <a:solidFill>
+                  <a:srgbClr val="DCDCDC"/>
+                </a:solidFill>
+              </a:defRPr>
+            </a:pPr>
+            <a:r>
+              <a:t>  • **Kullanıcı Arayüzü (UI/UX):** AI çıktılarının (işaretlemeler, tahminler) hekimin iş akışını bozmadan, anlaşılır ve faydalı bir şekilde sunulması. Alarm yorgunluğunu önleme.</a:t>
+            </a:r>
+          </a:p>
+          <a:p>
+            <a:pPr>
+              <a:spcAft>
+                <a:spcPts val="400"/>
+              </a:spcAft>
+              <a:defRPr sz="1400">
+                <a:solidFill>
+                  <a:srgbClr val="DCDCDC"/>
+                </a:solidFill>
+              </a:defRPr>
+            </a:pPr>
+            <a:r>
+              <a:t>  • **Validasyon ve Düzenleyici Onay:** AI sistemlerinin klinik etkinliğinin ve güvenliğinin titizlikle test edilmesi ve FDA/CE gibi onay süreçlerinden geçirilmesi.</a:t>
+            </a:r>
+          </a:p>
+          <a:p>
+            <a:pPr>
+              <a:spcAft>
+                <a:spcPts val="400"/>
+              </a:spcAft>
+              <a:defRPr sz="1400">
+                <a:solidFill>
+                  <a:srgbClr val="DCDCDC"/>
+                </a:solidFill>
+              </a:defRPr>
+            </a:pPr>
+            <a:r>
+              <a:t>**Keywords:** AI Engineering, Data Management, Algorithm Optimization, CNN Architectures, Real-Time Processing, Hardware Integration, GPU, UI/UX Design, Validation, Regulatory Approval.</a:t>
             </a:r>
           </a:p>
         </p:txBody>
@@ -3379,6 +3447,1563 @@
               </a:defRPr>
             </a:pPr>
             <a:r>
+              <a:t>Slide 11: Test Süreçleri: Fonksiyonel ve Mekanik Doğrulama</a:t>
+            </a:r>
+          </a:p>
+        </p:txBody>
+      </p:sp>
+      <p:sp>
+        <p:nvSpPr>
+          <p:cNvPr id="3" name="TextBox 2"/>
+          <p:cNvSpPr txBox="1"/>
+          <p:nvPr/>
+        </p:nvSpPr>
+        <p:spPr>
+          <a:xfrm>
+            <a:off x="457200" y="914400"/>
+            <a:ext cx="8229600" cy="5029200"/>
+          </a:xfrm>
+          <a:prstGeom prst="rect">
+            <a:avLst/>
+          </a:prstGeom>
+          <a:noFill/>
+        </p:spPr>
+        <p:txBody>
+          <a:bodyPr wrap="square" anchor="t">
+            <a:spAutoFit/>
+          </a:bodyPr>
+          <a:lstStyle/>
+          <a:p>
+            <a:pPr>
+              <a:spcAft>
+                <a:spcPts val="400"/>
+              </a:spcAft>
+              <a:defRPr sz="1400">
+                <a:solidFill>
+                  <a:srgbClr val="DCDCDC"/>
+                </a:solidFill>
+              </a:defRPr>
+            </a:pPr>
+            <a:r>
+              <a:t>Endoskoplar, klinik kullanıma sunulmadan önce kapsamlı testlerden geçer. Biyomedikal mühendisler bu süreçleri yönetir:</a:t>
+            </a:r>
+          </a:p>
+          <a:p>
+            <a:pPr>
+              <a:spcAft>
+                <a:spcPts val="400"/>
+              </a:spcAft>
+              <a:defRPr sz="1400">
+                <a:solidFill>
+                  <a:srgbClr val="DCDCDC"/>
+                </a:solidFill>
+              </a:defRPr>
+            </a:pPr>
+            <a:r>
+              <a:t>  • **Fonksiyonel Testler:**</a:t>
+            </a:r>
+          </a:p>
+          <a:p>
+            <a:pPr>
+              <a:spcAft>
+                <a:spcPts val="400"/>
+              </a:spcAft>
+              <a:defRPr sz="1400">
+                <a:solidFill>
+                  <a:srgbClr val="DCDCDC"/>
+                </a:solidFill>
+              </a:defRPr>
+            </a:pPr>
+            <a:r>
+              <a:t>  • Görüntü Kalitesi: Çözünürlük (MTF), renk doğruluğu (CRI), alan derinliği, distorsiyon testleri.</a:t>
+            </a:r>
+          </a:p>
+          <a:p>
+            <a:pPr>
+              <a:spcAft>
+                <a:spcPts val="400"/>
+              </a:spcAft>
+              <a:defRPr sz="1400">
+                <a:solidFill>
+                  <a:srgbClr val="DCDCDC"/>
+                </a:solidFill>
+              </a:defRPr>
+            </a:pPr>
+            <a:r>
+              <a:t>  • Aydınlatma: Parlaklık, homojenlik ölçümleri.</a:t>
+            </a:r>
+          </a:p>
+          <a:p>
+            <a:pPr>
+              <a:spcAft>
+                <a:spcPts val="400"/>
+              </a:spcAft>
+              <a:defRPr sz="1400">
+                <a:solidFill>
+                  <a:srgbClr val="DCDCDC"/>
+                </a:solidFill>
+              </a:defRPr>
+            </a:pPr>
+            <a:r>
+              <a:t>  • Artikülasyon: Yönlendirme açılarının ve hassasiyetinin doğrulanması.</a:t>
+            </a:r>
+          </a:p>
+          <a:p>
+            <a:pPr>
+              <a:spcAft>
+                <a:spcPts val="400"/>
+              </a:spcAft>
+              <a:defRPr sz="1400">
+                <a:solidFill>
+                  <a:srgbClr val="DCDCDC"/>
+                </a:solidFill>
+              </a:defRPr>
+            </a:pPr>
+            <a:r>
+              <a:t>  • Kanal Bütünlüğü: Sızdırmazlık, akış hızı testleri, alet geçiş kolaylığı.</a:t>
+            </a:r>
+          </a:p>
+          <a:p>
+            <a:pPr>
+              <a:spcAft>
+                <a:spcPts val="400"/>
+              </a:spcAft>
+              <a:defRPr sz="1400">
+                <a:solidFill>
+                  <a:srgbClr val="DCDCDC"/>
+                </a:solidFill>
+              </a:defRPr>
+            </a:pPr>
+            <a:r>
+              <a:t>  • **Mekanik Testler:**</a:t>
+            </a:r>
+          </a:p>
+          <a:p>
+            <a:pPr>
+              <a:spcAft>
+                <a:spcPts val="400"/>
+              </a:spcAft>
+              <a:defRPr sz="1400">
+                <a:solidFill>
+                  <a:srgbClr val="DCDCDC"/>
+                </a:solidFill>
+              </a:defRPr>
+            </a:pPr>
+            <a:r>
+              <a:t>  • Dayanıklılık: Bükülme yarıçapı testleri, tekrarlanan artikülasyon ile yorulma testleri.</a:t>
+            </a:r>
+          </a:p>
+          <a:p>
+            <a:pPr>
+              <a:spcAft>
+                <a:spcPts val="400"/>
+              </a:spcAft>
+              <a:defRPr sz="1400">
+                <a:solidFill>
+                  <a:srgbClr val="DCDCDC"/>
+                </a:solidFill>
+              </a:defRPr>
+            </a:pPr>
+            <a:r>
+              <a:t>  • Mukavemet: Çekme mukavemeti, yapışma/bağlantı noktası sağlamlığı.</a:t>
+            </a:r>
+          </a:p>
+          <a:p>
+            <a:pPr>
+              <a:spcAft>
+                <a:spcPts val="400"/>
+              </a:spcAft>
+              <a:defRPr sz="1400">
+                <a:solidFill>
+                  <a:srgbClr val="DCDCDC"/>
+                </a:solidFill>
+              </a:defRPr>
+            </a:pPr>
+            <a:r>
+              <a:t>  • Malzeme Özellikleri: Sertlik, esneklik ölçümleri.</a:t>
+            </a:r>
+          </a:p>
+          <a:p>
+            <a:pPr>
+              <a:spcAft>
+                <a:spcPts val="400"/>
+              </a:spcAft>
+              <a:defRPr sz="1400">
+                <a:solidFill>
+                  <a:srgbClr val="DCDCDC"/>
+                </a:solidFill>
+              </a:defRPr>
+            </a:pPr>
+            <a:r>
+              <a:t>**Keywords:** Functional Testing, Mechanical Testing, Image Quality (MTF, CRI), Articulation Testing, Channel Integrity, Durability Testing, Fatigue Testing, Tensile Strength.</a:t>
+            </a:r>
+          </a:p>
+        </p:txBody>
+      </p:sp>
+    </p:spTree>
+  </p:cSld>
+  <p:clrMapOvr>
+    <a:masterClrMapping/>
+  </p:clrMapOvr>
+</p:sld>
+</file>
+
+<file path=ppt/slides/slide12.xml><?xml version="1.0" encoding="utf-8"?>
+<p:sld xmlns:a="http://schemas.openxmlformats.org/drawingml/2006/main" xmlns:p="http://schemas.openxmlformats.org/presentationml/2006/main" xmlns:r="http://schemas.openxmlformats.org/officeDocument/2006/relationships">
+  <p:cSld>
+    <p:bg>
+      <p:bgPr>
+        <a:solidFill>
+          <a:srgbClr val="000000"/>
+        </a:solidFill>
+        <a:effectLst/>
+      </p:bgPr>
+    </p:bg>
+    <p:spTree>
+      <p:nvGrpSpPr>
+        <p:cNvPr id="1" name=""/>
+        <p:cNvGrpSpPr/>
+        <p:nvPr/>
+      </p:nvGrpSpPr>
+      <p:grpSpPr/>
+      <p:sp>
+        <p:nvSpPr>
+          <p:cNvPr id="2" name="TextBox 1"/>
+          <p:cNvSpPr txBox="1"/>
+          <p:nvPr/>
+        </p:nvSpPr>
+        <p:spPr>
+          <a:xfrm>
+            <a:off x="457200" y="182880"/>
+            <a:ext cx="8229600" cy="731520"/>
+          </a:xfrm>
+          <a:prstGeom prst="rect">
+            <a:avLst/>
+          </a:prstGeom>
+          <a:noFill/>
+        </p:spPr>
+        <p:txBody>
+          <a:bodyPr wrap="square">
+            <a:spAutoFit/>
+          </a:bodyPr>
+          <a:lstStyle/>
+          <a:p>
+            <a:pPr>
+              <a:defRPr b="1" sz="2800">
+                <a:solidFill>
+                  <a:srgbClr val="FFFFFF"/>
+                </a:solidFill>
+              </a:defRPr>
+            </a:pPr>
+            <a:r>
+              <a:t>Slide 12: Test Süreçleri: Güvenlik, Sterilizasyon ve Yazılım Validasyonu</a:t>
+            </a:r>
+          </a:p>
+        </p:txBody>
+      </p:sp>
+      <p:sp>
+        <p:nvSpPr>
+          <p:cNvPr id="3" name="TextBox 2"/>
+          <p:cNvSpPr txBox="1"/>
+          <p:nvPr/>
+        </p:nvSpPr>
+        <p:spPr>
+          <a:xfrm>
+            <a:off x="457200" y="914400"/>
+            <a:ext cx="8229600" cy="5029200"/>
+          </a:xfrm>
+          <a:prstGeom prst="rect">
+            <a:avLst/>
+          </a:prstGeom>
+          <a:noFill/>
+        </p:spPr>
+        <p:txBody>
+          <a:bodyPr wrap="square" anchor="t">
+            <a:spAutoFit/>
+          </a:bodyPr>
+          <a:lstStyle/>
+          <a:p>
+            <a:pPr>
+              <a:spcAft>
+                <a:spcPts val="400"/>
+              </a:spcAft>
+              <a:defRPr sz="1400">
+                <a:solidFill>
+                  <a:srgbClr val="DCDCDC"/>
+                </a:solidFill>
+              </a:defRPr>
+            </a:pPr>
+            <a:r>
+              <a:t>Güvenlik ve güvenilirlik odaklı testler:</a:t>
+            </a:r>
+          </a:p>
+          <a:p>
+            <a:pPr>
+              <a:spcAft>
+                <a:spcPts val="400"/>
+              </a:spcAft>
+              <a:defRPr sz="1400">
+                <a:solidFill>
+                  <a:srgbClr val="DCDCDC"/>
+                </a:solidFill>
+              </a:defRPr>
+            </a:pPr>
+            <a:r>
+              <a:t>  • **Biyouyumluluk Testleri:** ISO 10993 standartlarına göre malzeme ve nihai ürün üzerinde yapılır.</a:t>
+            </a:r>
+          </a:p>
+          <a:p>
+            <a:pPr>
+              <a:spcAft>
+                <a:spcPts val="400"/>
+              </a:spcAft>
+              <a:defRPr sz="1400">
+                <a:solidFill>
+                  <a:srgbClr val="DCDCDC"/>
+                </a:solidFill>
+              </a:defRPr>
+            </a:pPr>
+            <a:r>
+              <a:t>  • **Sterilizasyon/Dezenfeksiyon Validasyonu:** Seçilen yöntemin (örn. EtO, HLD) etkinliğinin (mikrobiyal öldürme) ve cihaz üzerindeki tekrarlanan etkilerinin (malzeme bozulması, fonksiyon kaybı) doğrulanması (ISO 17665, ISO 15883).</a:t>
+            </a:r>
+          </a:p>
+          <a:p>
+            <a:pPr>
+              <a:spcAft>
+                <a:spcPts val="400"/>
+              </a:spcAft>
+              <a:defRPr sz="1400">
+                <a:solidFill>
+                  <a:srgbClr val="DCDCDC"/>
+                </a:solidFill>
+              </a:defRPr>
+            </a:pPr>
+            <a:r>
+              <a:t>  • **Elektriksel Güvenlik Testleri:** IEC 60601 standartlarına göre kaçak akım, yalıtım direnci, dielektrik dayanım testleri.</a:t>
+            </a:r>
+          </a:p>
+          <a:p>
+            <a:pPr>
+              <a:spcAft>
+                <a:spcPts val="400"/>
+              </a:spcAft>
+              <a:defRPr sz="1400">
+                <a:solidFill>
+                  <a:srgbClr val="DCDCDC"/>
+                </a:solidFill>
+              </a:defRPr>
+            </a:pPr>
+            <a:r>
+              <a:t>  • **Yazılım Validasyonu (IEC 62304):** Cihazın gömülü yazılımının veya AI algoritmalarının güvenilirliği, güvenliği ve performansının doğrulanması. Risk analizi ve test dokümantasyonu kritiktir.</a:t>
+            </a:r>
+          </a:p>
+          <a:p>
+            <a:pPr>
+              <a:spcAft>
+                <a:spcPts val="400"/>
+              </a:spcAft>
+              <a:defRPr sz="1400">
+                <a:solidFill>
+                  <a:srgbClr val="DCDCDC"/>
+                </a:solidFill>
+              </a:defRPr>
+            </a:pPr>
+            <a:r>
+              <a:t>**Keywords:** Safety Testing, Biocompatibility (ISO 10993), Sterilization Validation (ISO 17665), Disinfection Validation (ISO 15883), Electrical Safety (IEC 60601), Software Validation (IEC 62304), Risk Analysis.</a:t>
+            </a:r>
+          </a:p>
+        </p:txBody>
+      </p:sp>
+    </p:spTree>
+  </p:cSld>
+  <p:clrMapOvr>
+    <a:masterClrMapping/>
+  </p:clrMapOvr>
+</p:sld>
+</file>
+
+<file path=ppt/slides/slide13.xml><?xml version="1.0" encoding="utf-8"?>
+<p:sld xmlns:a="http://schemas.openxmlformats.org/drawingml/2006/main" xmlns:p="http://schemas.openxmlformats.org/presentationml/2006/main" xmlns:r="http://schemas.openxmlformats.org/officeDocument/2006/relationships">
+  <p:cSld>
+    <p:bg>
+      <p:bgPr>
+        <a:solidFill>
+          <a:srgbClr val="000000"/>
+        </a:solidFill>
+        <a:effectLst/>
+      </p:bgPr>
+    </p:bg>
+    <p:spTree>
+      <p:nvGrpSpPr>
+        <p:cNvPr id="1" name=""/>
+        <p:cNvGrpSpPr/>
+        <p:nvPr/>
+      </p:nvGrpSpPr>
+      <p:grpSpPr/>
+      <p:sp>
+        <p:nvSpPr>
+          <p:cNvPr id="2" name="TextBox 1"/>
+          <p:cNvSpPr txBox="1"/>
+          <p:nvPr/>
+        </p:nvSpPr>
+        <p:spPr>
+          <a:xfrm>
+            <a:off x="457200" y="182880"/>
+            <a:ext cx="8229600" cy="731520"/>
+          </a:xfrm>
+          <a:prstGeom prst="rect">
+            <a:avLst/>
+          </a:prstGeom>
+          <a:noFill/>
+        </p:spPr>
+        <p:txBody>
+          <a:bodyPr wrap="square">
+            <a:spAutoFit/>
+          </a:bodyPr>
+          <a:lstStyle/>
+          <a:p>
+            <a:pPr>
+              <a:defRPr b="1" sz="2800">
+                <a:solidFill>
+                  <a:srgbClr val="FFFFFF"/>
+                </a:solidFill>
+              </a:defRPr>
+            </a:pPr>
+            <a:r>
+              <a:t>Slide 13: Kullanıcı Geri Bildirimi ile İteratif Mühendislik</a:t>
+            </a:r>
+          </a:p>
+        </p:txBody>
+      </p:sp>
+      <p:sp>
+        <p:nvSpPr>
+          <p:cNvPr id="3" name="TextBox 2"/>
+          <p:cNvSpPr txBox="1"/>
+          <p:nvPr/>
+        </p:nvSpPr>
+        <p:spPr>
+          <a:xfrm>
+            <a:off x="457200" y="914400"/>
+            <a:ext cx="8229600" cy="5029200"/>
+          </a:xfrm>
+          <a:prstGeom prst="rect">
+            <a:avLst/>
+          </a:prstGeom>
+          <a:noFill/>
+        </p:spPr>
+        <p:txBody>
+          <a:bodyPr wrap="square" anchor="t">
+            <a:spAutoFit/>
+          </a:bodyPr>
+          <a:lstStyle/>
+          <a:p>
+            <a:pPr>
+              <a:spcAft>
+                <a:spcPts val="400"/>
+              </a:spcAft>
+              <a:defRPr sz="1400">
+                <a:solidFill>
+                  <a:srgbClr val="DCDCDC"/>
+                </a:solidFill>
+              </a:defRPr>
+            </a:pPr>
+            <a:r>
+              <a:t>En iyi mühendislik çözümleri, klinik ihtiyaçlar ve kullanıcı deneyimi ile şekillenir. Biyomedikal mühendisler, hekimler ve hemşirelerle yakın çalışarak geri bildirim toplar:</a:t>
+            </a:r>
+          </a:p>
+          <a:p>
+            <a:pPr>
+              <a:spcAft>
+                <a:spcPts val="400"/>
+              </a:spcAft>
+              <a:defRPr sz="1400">
+                <a:solidFill>
+                  <a:srgbClr val="DCDCDC"/>
+                </a:solidFill>
+              </a:defRPr>
+            </a:pPr>
+            <a:r>
+              <a:t>  • **Ergonomi:** Kontrol ünitesi tutuşu, düğme yerleşimi, ağırlık dengesi.</a:t>
+            </a:r>
+          </a:p>
+          <a:p>
+            <a:pPr>
+              <a:spcAft>
+                <a:spcPts val="400"/>
+              </a:spcAft>
+              <a:defRPr sz="1400">
+                <a:solidFill>
+                  <a:srgbClr val="DCDCDC"/>
+                </a:solidFill>
+              </a:defRPr>
+            </a:pPr>
+            <a:r>
+              <a:t>  • **Kullanılabilirlik:** Alet geçişi, yönlendirme kolaylığı, görüntü kalitesi algısı.</a:t>
+            </a:r>
+          </a:p>
+          <a:p>
+            <a:pPr>
+              <a:spcAft>
+                <a:spcPts val="400"/>
+              </a:spcAft>
+              <a:defRPr sz="1400">
+                <a:solidFill>
+                  <a:srgbClr val="DCDCDC"/>
+                </a:solidFill>
+              </a:defRPr>
+            </a:pPr>
+            <a:r>
+              <a:t>  • **Performans:** Klinik senaryolarda karşılaşılan zorluklar, beklenmedik durumlar.</a:t>
+            </a:r>
+          </a:p>
+          <a:p>
+            <a:pPr>
+              <a:spcAft>
+                <a:spcPts val="400"/>
+              </a:spcAft>
+              <a:defRPr sz="1400">
+                <a:solidFill>
+                  <a:srgbClr val="DCDCDC"/>
+                </a:solidFill>
+              </a:defRPr>
+            </a:pPr>
+            <a:r>
+              <a:t>  • **Dayanıklılık/Bakım:** Arıza modları, temizlik/sterilizasyon zorlukları.</a:t>
+            </a:r>
+          </a:p>
+          <a:p>
+            <a:pPr>
+              <a:spcAft>
+                <a:spcPts val="400"/>
+              </a:spcAft>
+              <a:defRPr sz="1400">
+                <a:solidFill>
+                  <a:srgbClr val="DCDCDC"/>
+                </a:solidFill>
+              </a:defRPr>
+            </a:pPr>
+            <a:r>
+              <a:t>Bu geri bildirimler, tasarım güncellemeleri ve yeni nesil cihazlar için temel oluşturur. Mühendislik, sürekli bir iyileştirme döngüsüdür.</a:t>
+            </a:r>
+          </a:p>
+          <a:p>
+            <a:pPr>
+              <a:spcAft>
+                <a:spcPts val="400"/>
+              </a:spcAft>
+              <a:defRPr sz="1400">
+                <a:solidFill>
+                  <a:srgbClr val="DCDCDC"/>
+                </a:solidFill>
+              </a:defRPr>
+            </a:pPr>
+            <a:r>
+              <a:t>**Keywords:** User Feedback, Iterative Design, Clinical Collaboration, Ergonomics, Usability, Performance Improvement, Durability, Maintenance, Engineering Cycle.</a:t>
+            </a:r>
+          </a:p>
+        </p:txBody>
+      </p:sp>
+    </p:spTree>
+  </p:cSld>
+  <p:clrMapOvr>
+    <a:masterClrMapping/>
+  </p:clrMapOvr>
+</p:sld>
+</file>
+
+<file path=ppt/slides/slide14.xml><?xml version="1.0" encoding="utf-8"?>
+<p:sld xmlns:a="http://schemas.openxmlformats.org/drawingml/2006/main" xmlns:p="http://schemas.openxmlformats.org/presentationml/2006/main" xmlns:r="http://schemas.openxmlformats.org/officeDocument/2006/relationships">
+  <p:cSld>
+    <p:bg>
+      <p:bgPr>
+        <a:solidFill>
+          <a:srgbClr val="000000"/>
+        </a:solidFill>
+        <a:effectLst/>
+      </p:bgPr>
+    </p:bg>
+    <p:spTree>
+      <p:nvGrpSpPr>
+        <p:cNvPr id="1" name=""/>
+        <p:cNvGrpSpPr/>
+        <p:nvPr/>
+      </p:nvGrpSpPr>
+      <p:grpSpPr/>
+      <p:sp>
+        <p:nvSpPr>
+          <p:cNvPr id="2" name="TextBox 1"/>
+          <p:cNvSpPr txBox="1"/>
+          <p:nvPr/>
+        </p:nvSpPr>
+        <p:spPr>
+          <a:xfrm>
+            <a:off x="457200" y="182880"/>
+            <a:ext cx="8229600" cy="731520"/>
+          </a:xfrm>
+          <a:prstGeom prst="rect">
+            <a:avLst/>
+          </a:prstGeom>
+          <a:noFill/>
+        </p:spPr>
+        <p:txBody>
+          <a:bodyPr wrap="square">
+            <a:spAutoFit/>
+          </a:bodyPr>
+          <a:lstStyle/>
+          <a:p>
+            <a:pPr>
+              <a:defRPr b="1" sz="2800">
+                <a:solidFill>
+                  <a:srgbClr val="FFFFFF"/>
+                </a:solidFill>
+              </a:defRPr>
+            </a:pPr>
+            <a:r>
+              <a:t>Slide 14: İnovasyon: Kapsül Endoskopi – Bir Mühendislik Harikası</a:t>
+            </a:r>
+          </a:p>
+        </p:txBody>
+      </p:sp>
+      <p:sp>
+        <p:nvSpPr>
+          <p:cNvPr id="3" name="TextBox 2"/>
+          <p:cNvSpPr txBox="1"/>
+          <p:nvPr/>
+        </p:nvSpPr>
+        <p:spPr>
+          <a:xfrm>
+            <a:off x="457200" y="914400"/>
+            <a:ext cx="8229600" cy="5029200"/>
+          </a:xfrm>
+          <a:prstGeom prst="rect">
+            <a:avLst/>
+          </a:prstGeom>
+          <a:noFill/>
+        </p:spPr>
+        <p:txBody>
+          <a:bodyPr wrap="square" anchor="t">
+            <a:spAutoFit/>
+          </a:bodyPr>
+          <a:lstStyle/>
+          <a:p>
+            <a:pPr>
+              <a:spcAft>
+                <a:spcPts val="400"/>
+              </a:spcAft>
+              <a:defRPr sz="1400">
+                <a:solidFill>
+                  <a:srgbClr val="DCDCDC"/>
+                </a:solidFill>
+              </a:defRPr>
+            </a:pPr>
+            <a:r>
+              <a:t>Kapsül endoskopi, minimal invaziv görüntülemenin sınırlarını zorlayan bir teknolojidir:</a:t>
+            </a:r>
+          </a:p>
+          <a:p>
+            <a:pPr>
+              <a:spcAft>
+                <a:spcPts val="400"/>
+              </a:spcAft>
+              <a:defRPr sz="1400">
+                <a:solidFill>
+                  <a:srgbClr val="DCDCDC"/>
+                </a:solidFill>
+              </a:defRPr>
+            </a:pPr>
+            <a:r>
+              <a:t>  • **Konsept:** Yutulabilir, vitamin hapı boyutunda, kendi kendine yeten kablosuz kamera.</a:t>
+            </a:r>
+          </a:p>
+          <a:p>
+            <a:pPr>
+              <a:spcAft>
+                <a:spcPts val="400"/>
+              </a:spcAft>
+              <a:defRPr sz="1400">
+                <a:solidFill>
+                  <a:srgbClr val="DCDCDC"/>
+                </a:solidFill>
+              </a:defRPr>
+            </a:pPr>
+            <a:r>
+              <a:t>  • **Uygulama:** Özellikle ince bağırsağın görüntülenmesi.</a:t>
+            </a:r>
+          </a:p>
+          <a:p>
+            <a:pPr>
+              <a:spcAft>
+                <a:spcPts val="400"/>
+              </a:spcAft>
+              <a:defRPr sz="1400">
+                <a:solidFill>
+                  <a:srgbClr val="DCDCDC"/>
+                </a:solidFill>
+              </a:defRPr>
+            </a:pPr>
+            <a:r>
+              <a:t>  • **Mühendislik Başarıları:**</a:t>
+            </a:r>
+          </a:p>
+          <a:p>
+            <a:pPr>
+              <a:spcAft>
+                <a:spcPts val="400"/>
+              </a:spcAft>
+              <a:defRPr sz="1400">
+                <a:solidFill>
+                  <a:srgbClr val="DCDCDC"/>
+                </a:solidFill>
+              </a:defRPr>
+            </a:pPr>
+            <a:r>
+              <a:t>  • **Minyatürleşme:** Kamera, LED'ler, pil, ASIC (Uygulamaya Özel Entegre Devre) ve RF vericinin küçük bir kapsüle sığdırılması.</a:t>
+            </a:r>
+          </a:p>
+          <a:p>
+            <a:pPr>
+              <a:spcAft>
+                <a:spcPts val="400"/>
+              </a:spcAft>
+              <a:defRPr sz="1400">
+                <a:solidFill>
+                  <a:srgbClr val="DCDCDC"/>
+                </a:solidFill>
+              </a:defRPr>
+            </a:pPr>
+            <a:r>
+              <a:t>  • **Düşük Güç Tüketimi:** Pil ömrünün tüm sindirim sistemi geçişi (~8-12 saat) boyunca yetmesi.</a:t>
+            </a:r>
+          </a:p>
+          <a:p>
+            <a:pPr>
+              <a:spcAft>
+                <a:spcPts val="400"/>
+              </a:spcAft>
+              <a:defRPr sz="1400">
+                <a:solidFill>
+                  <a:srgbClr val="DCDCDC"/>
+                </a:solidFill>
+              </a:defRPr>
+            </a:pPr>
+            <a:r>
+              <a:t>  • **Kablosuz İletişim:** Vücut içinden güvenilir RF veri aktarımı (örn. MICS bandı).</a:t>
+            </a:r>
+          </a:p>
+          <a:p>
+            <a:pPr>
+              <a:spcAft>
+                <a:spcPts val="400"/>
+              </a:spcAft>
+              <a:defRPr sz="1400">
+                <a:solidFill>
+                  <a:srgbClr val="DCDCDC"/>
+                </a:solidFill>
+              </a:defRPr>
+            </a:pPr>
+            <a:r>
+              <a:t>  • **Biyouyumluluk ve Güvenlik:** Kapsülün güvenli malzemelerden yapılması ve sorunsuz atılımı.</a:t>
+            </a:r>
+          </a:p>
+          <a:p>
+            <a:pPr>
+              <a:spcAft>
+                <a:spcPts val="400"/>
+              </a:spcAft>
+              <a:defRPr sz="1400">
+                <a:solidFill>
+                  <a:srgbClr val="DCDCDC"/>
+                </a:solidFill>
+              </a:defRPr>
+            </a:pPr>
+            <a:r>
+              <a:t>  • **Gelecek:** Manyetik yönlendirme, biyopsi yeteneği, AI entegrasyonu gibi gelişmeler hedefleniyor.</a:t>
+            </a:r>
+          </a:p>
+          <a:p>
+            <a:pPr>
+              <a:spcAft>
+                <a:spcPts val="400"/>
+              </a:spcAft>
+              <a:defRPr sz="1400">
+                <a:solidFill>
+                  <a:srgbClr val="DCDCDC"/>
+                </a:solidFill>
+              </a:defRPr>
+            </a:pPr>
+            <a:r>
+              <a:t>**Keywords:** Capsule Endoscopy, Miniaturization, Low Power Design, Wireless Communication (RF), ASIC, Biocompatibility, Small Bowel Imaging, Engineering Innovation.</a:t>
+            </a:r>
+          </a:p>
+        </p:txBody>
+      </p:sp>
+    </p:spTree>
+  </p:cSld>
+  <p:clrMapOvr>
+    <a:masterClrMapping/>
+  </p:clrMapOvr>
+</p:sld>
+</file>
+
+<file path=ppt/slides/slide15.xml><?xml version="1.0" encoding="utf-8"?>
+<p:sld xmlns:a="http://schemas.openxmlformats.org/drawingml/2006/main" xmlns:p="http://schemas.openxmlformats.org/presentationml/2006/main" xmlns:r="http://schemas.openxmlformats.org/officeDocument/2006/relationships">
+  <p:cSld>
+    <p:bg>
+      <p:bgPr>
+        <a:solidFill>
+          <a:srgbClr val="000000"/>
+        </a:solidFill>
+        <a:effectLst/>
+      </p:bgPr>
+    </p:bg>
+    <p:spTree>
+      <p:nvGrpSpPr>
+        <p:cNvPr id="1" name=""/>
+        <p:cNvGrpSpPr/>
+        <p:nvPr/>
+      </p:nvGrpSpPr>
+      <p:grpSpPr/>
+      <p:sp>
+        <p:nvSpPr>
+          <p:cNvPr id="2" name="TextBox 1"/>
+          <p:cNvSpPr txBox="1"/>
+          <p:nvPr/>
+        </p:nvSpPr>
+        <p:spPr>
+          <a:xfrm>
+            <a:off x="457200" y="182880"/>
+            <a:ext cx="8229600" cy="731520"/>
+          </a:xfrm>
+          <a:prstGeom prst="rect">
+            <a:avLst/>
+          </a:prstGeom>
+          <a:noFill/>
+        </p:spPr>
+        <p:txBody>
+          <a:bodyPr wrap="square">
+            <a:spAutoFit/>
+          </a:bodyPr>
+          <a:lstStyle/>
+          <a:p>
+            <a:pPr>
+              <a:defRPr b="1" sz="2800">
+                <a:solidFill>
+                  <a:srgbClr val="FFFFFF"/>
+                </a:solidFill>
+              </a:defRPr>
+            </a:pPr>
+            <a:r>
+              <a:t>Slide 15: Gelecek Vizyonu: Robotik ve Gelişmiş Yönlendirme</a:t>
+            </a:r>
+          </a:p>
+        </p:txBody>
+      </p:sp>
+      <p:sp>
+        <p:nvSpPr>
+          <p:cNvPr id="3" name="TextBox 2"/>
+          <p:cNvSpPr txBox="1"/>
+          <p:nvPr/>
+        </p:nvSpPr>
+        <p:spPr>
+          <a:xfrm>
+            <a:off x="457200" y="914400"/>
+            <a:ext cx="8229600" cy="5029200"/>
+          </a:xfrm>
+          <a:prstGeom prst="rect">
+            <a:avLst/>
+          </a:prstGeom>
+          <a:noFill/>
+        </p:spPr>
+        <p:txBody>
+          <a:bodyPr wrap="square" anchor="t">
+            <a:spAutoFit/>
+          </a:bodyPr>
+          <a:lstStyle/>
+          <a:p>
+            <a:pPr>
+              <a:spcAft>
+                <a:spcPts val="400"/>
+              </a:spcAft>
+              <a:defRPr sz="1400">
+                <a:solidFill>
+                  <a:srgbClr val="DCDCDC"/>
+                </a:solidFill>
+              </a:defRPr>
+            </a:pPr>
+            <a:r>
+              <a:t>Endoskopinin geleceği daha fazla otomasyon ve hassasiyet vaat ediyor:</a:t>
+            </a:r>
+          </a:p>
+          <a:p>
+            <a:pPr>
+              <a:spcAft>
+                <a:spcPts val="400"/>
+              </a:spcAft>
+              <a:defRPr sz="1400">
+                <a:solidFill>
+                  <a:srgbClr val="DCDCDC"/>
+                </a:solidFill>
+              </a:defRPr>
+            </a:pPr>
+            <a:r>
+              <a:t>  • **Robotik Endoskopi Platformları:** Esnek robotik kollar veya yılan benzeri robotlar ile daha hassas navigasyon, stabilizasyon ve potansiyel olarak cerrahi müdahaleler. Master-slave kontrol sistemleri.</a:t>
+            </a:r>
+          </a:p>
+          <a:p>
+            <a:pPr>
+              <a:spcAft>
+                <a:spcPts val="400"/>
+              </a:spcAft>
+              <a:defRPr sz="1400">
+                <a:solidFill>
+                  <a:srgbClr val="DCDCDC"/>
+                </a:solidFill>
+              </a:defRPr>
+            </a:pPr>
+            <a:r>
+              <a:t>  • **Manyetik Yönlendirme:** Özellikle kapsül endoskoplar için, dışarıdan uygulanan manyetik alanlarla kapsülün aktif olarak yönlendirilmesi ve belirli bölgelerde durdurulması.</a:t>
+            </a:r>
+          </a:p>
+          <a:p>
+            <a:pPr>
+              <a:spcAft>
+                <a:spcPts val="400"/>
+              </a:spcAft>
+              <a:defRPr sz="1400">
+                <a:solidFill>
+                  <a:srgbClr val="DCDCDC"/>
+                </a:solidFill>
+              </a:defRPr>
+            </a:pPr>
+            <a:r>
+              <a:t>  • **Kendi Kendine İlerleyen Sistemler:** İnç kurdu (inchworm) veya diğer biyo-esinlenmiş mekanizmalarla aktif olarak ilerleyebilen endoskoplar.</a:t>
+            </a:r>
+          </a:p>
+          <a:p>
+            <a:pPr>
+              <a:spcAft>
+                <a:spcPts val="400"/>
+              </a:spcAft>
+              <a:defRPr sz="1400">
+                <a:solidFill>
+                  <a:srgbClr val="DCDCDC"/>
+                </a:solidFill>
+              </a:defRPr>
+            </a:pPr>
+            <a:r>
+              <a:t>  • **Mühendislik Odakları:** Robot kinematiği, kontrol teorisi, sensör entegrasyonu, minyatür aktüatörler, manyetik alan modellemesi. Boğaziçi Üniversitesi'nin projesi ([Kaynak](https://haberler.bogazici.edu.tr/tr/haber/bogazici-universitesi-agrisiz-ve-hizli-kolonoskopi-icin-robot-gelistiriyor)) bu alandaki yerel çalışmalara örnektir.</a:t>
+            </a:r>
+          </a:p>
+          <a:p>
+            <a:pPr>
+              <a:spcAft>
+                <a:spcPts val="400"/>
+              </a:spcAft>
+              <a:defRPr sz="1400">
+                <a:solidFill>
+                  <a:srgbClr val="DCDCDC"/>
+                </a:solidFill>
+              </a:defRPr>
+            </a:pPr>
+            <a:r>
+              <a:t>**Keywords:** Robotic Endoscopy, Flexible Robotics, Magnetic Steering, Self-Propelled Endoscopes, Automation, Control Systems, Actuators, Robotics Engineering.</a:t>
+            </a:r>
+          </a:p>
+        </p:txBody>
+      </p:sp>
+    </p:spTree>
+  </p:cSld>
+  <p:clrMapOvr>
+    <a:masterClrMapping/>
+  </p:clrMapOvr>
+</p:sld>
+</file>
+
+<file path=ppt/slides/slide16.xml><?xml version="1.0" encoding="utf-8"?>
+<p:sld xmlns:a="http://schemas.openxmlformats.org/drawingml/2006/main" xmlns:p="http://schemas.openxmlformats.org/presentationml/2006/main" xmlns:r="http://schemas.openxmlformats.org/officeDocument/2006/relationships">
+  <p:cSld>
+    <p:bg>
+      <p:bgPr>
+        <a:solidFill>
+          <a:srgbClr val="000000"/>
+        </a:solidFill>
+        <a:effectLst/>
+      </p:bgPr>
+    </p:bg>
+    <p:spTree>
+      <p:nvGrpSpPr>
+        <p:cNvPr id="1" name=""/>
+        <p:cNvGrpSpPr/>
+        <p:nvPr/>
+      </p:nvGrpSpPr>
+      <p:grpSpPr/>
+      <p:sp>
+        <p:nvSpPr>
+          <p:cNvPr id="2" name="TextBox 1"/>
+          <p:cNvSpPr txBox="1"/>
+          <p:nvPr/>
+        </p:nvSpPr>
+        <p:spPr>
+          <a:xfrm>
+            <a:off x="457200" y="182880"/>
+            <a:ext cx="8229600" cy="731520"/>
+          </a:xfrm>
+          <a:prstGeom prst="rect">
+            <a:avLst/>
+          </a:prstGeom>
+          <a:noFill/>
+        </p:spPr>
+        <p:txBody>
+          <a:bodyPr wrap="square">
+            <a:spAutoFit/>
+          </a:bodyPr>
+          <a:lstStyle/>
+          <a:p>
+            <a:pPr>
+              <a:defRPr b="1" sz="2800">
+                <a:solidFill>
+                  <a:srgbClr val="FFFFFF"/>
+                </a:solidFill>
+              </a:defRPr>
+            </a:pPr>
+            <a:r>
+              <a:t>Slide 16: Gelecek Vizyonu: Gelişmiş Görüntüleme ve Derin AI Entegrasyonu</a:t>
+            </a:r>
+          </a:p>
+        </p:txBody>
+      </p:sp>
+      <p:sp>
+        <p:nvSpPr>
+          <p:cNvPr id="3" name="TextBox 2"/>
+          <p:cNvSpPr txBox="1"/>
+          <p:nvPr/>
+        </p:nvSpPr>
+        <p:spPr>
+          <a:xfrm>
+            <a:off x="457200" y="914400"/>
+            <a:ext cx="8229600" cy="5029200"/>
+          </a:xfrm>
+          <a:prstGeom prst="rect">
+            <a:avLst/>
+          </a:prstGeom>
+          <a:noFill/>
+        </p:spPr>
+        <p:txBody>
+          <a:bodyPr wrap="square" anchor="t">
+            <a:spAutoFit/>
+          </a:bodyPr>
+          <a:lstStyle/>
+          <a:p>
+            <a:pPr>
+              <a:spcAft>
+                <a:spcPts val="400"/>
+              </a:spcAft>
+              <a:defRPr sz="1400">
+                <a:solidFill>
+                  <a:srgbClr val="DCDCDC"/>
+                </a:solidFill>
+              </a:defRPr>
+            </a:pPr>
+            <a:r>
+              <a:t>Görüntüleme yetenekleri ve AI'nın rolü daha da artacak:</a:t>
+            </a:r>
+          </a:p>
+          <a:p>
+            <a:pPr>
+              <a:spcAft>
+                <a:spcPts val="400"/>
+              </a:spcAft>
+              <a:defRPr sz="1400">
+                <a:solidFill>
+                  <a:srgbClr val="DCDCDC"/>
+                </a:solidFill>
+              </a:defRPr>
+            </a:pPr>
+            <a:r>
+              <a:t>  • **Gelişmiş Görüntüleme Teknikleri:**</a:t>
+            </a:r>
+          </a:p>
+          <a:p>
+            <a:pPr>
+              <a:spcAft>
+                <a:spcPts val="400"/>
+              </a:spcAft>
+              <a:defRPr sz="1400">
+                <a:solidFill>
+                  <a:srgbClr val="DCDCDC"/>
+                </a:solidFill>
+              </a:defRPr>
+            </a:pPr>
+            <a:r>
+              <a:t>  • **Optik Koherens Tomografi (OCT):** Doku katmanlarının mikron düzeyinde kesitsel görüntülenmesi ("optik biyopsi").</a:t>
+            </a:r>
+          </a:p>
+          <a:p>
+            <a:pPr>
+              <a:spcAft>
+                <a:spcPts val="400"/>
+              </a:spcAft>
+              <a:defRPr sz="1400">
+                <a:solidFill>
+                  <a:srgbClr val="DCDCDC"/>
+                </a:solidFill>
+              </a:defRPr>
+            </a:pPr>
+            <a:r>
+              <a:t>  • **Hiperspektral/Multispektral Görüntüleme:** Dokunun kimyasal ve moleküler bilgisine erişim, daha hassas doku karakterizasyonu.</a:t>
+            </a:r>
+          </a:p>
+          <a:p>
+            <a:pPr>
+              <a:spcAft>
+                <a:spcPts val="400"/>
+              </a:spcAft>
+              <a:defRPr sz="1400">
+                <a:solidFill>
+                  <a:srgbClr val="DCDCDC"/>
+                </a:solidFill>
+              </a:defRPr>
+            </a:pPr>
+            <a:r>
+              <a:t>  • **Konfokal Lazer Endomikroskopi (CLE):** Hücresel düzeyde gerçek zamanlı görüntüleme.</a:t>
+            </a:r>
+          </a:p>
+          <a:p>
+            <a:pPr>
+              <a:spcAft>
+                <a:spcPts val="400"/>
+              </a:spcAft>
+              <a:defRPr sz="1400">
+                <a:solidFill>
+                  <a:srgbClr val="DCDCDC"/>
+                </a:solidFill>
+              </a:defRPr>
+            </a:pPr>
+            <a:r>
+              <a:t>  • **Derin AI Entegrasyonu:**</a:t>
+            </a:r>
+          </a:p>
+          <a:p>
+            <a:pPr>
+              <a:spcAft>
+                <a:spcPts val="400"/>
+              </a:spcAft>
+              <a:defRPr sz="1400">
+                <a:solidFill>
+                  <a:srgbClr val="DCDCDC"/>
+                </a:solidFill>
+              </a:defRPr>
+            </a:pPr>
+            <a:r>
+              <a:t>  • **Tanısal Doğruluk Ötesi:** Risk skorlaması, tedaviye yanıt tahmini, prosedür planlama yardımı.</a:t>
+            </a:r>
+          </a:p>
+          <a:p>
+            <a:pPr>
+              <a:spcAft>
+                <a:spcPts val="400"/>
+              </a:spcAft>
+              <a:defRPr sz="1400">
+                <a:solidFill>
+                  <a:srgbClr val="DCDCDC"/>
+                </a:solidFill>
+              </a:defRPr>
+            </a:pPr>
+            <a:r>
+              <a:t>  • **Otonom Fonksiyonlar:** Belirli görevlerde (örn. şüpheli alan taraması) AI'nın daha aktif rol alması.</a:t>
+            </a:r>
+          </a:p>
+          <a:p>
+            <a:pPr>
+              <a:spcAft>
+                <a:spcPts val="400"/>
+              </a:spcAft>
+              <a:defRPr sz="1400">
+                <a:solidFill>
+                  <a:srgbClr val="DCDCDC"/>
+                </a:solidFill>
+              </a:defRPr>
+            </a:pPr>
+            <a:r>
+              <a:t>  • **Kişiselleştirilmiş Tıp:** Hastanın verilerine göre optimize edilmiş inceleme veya tedavi önerileri.</a:t>
+            </a:r>
+          </a:p>
+          <a:p>
+            <a:pPr>
+              <a:spcAft>
+                <a:spcPts val="400"/>
+              </a:spcAft>
+              <a:defRPr sz="1400">
+                <a:solidFill>
+                  <a:srgbClr val="DCDCDC"/>
+                </a:solidFill>
+              </a:defRPr>
+            </a:pPr>
+            <a:r>
+              <a:t>  • **Mühendislik Alanları:** Optik mühendisliği, sinyal/görüntü işleme, AI/makine öğrenmesi, büyük veri analizi.</a:t>
+            </a:r>
+          </a:p>
+          <a:p>
+            <a:pPr>
+              <a:spcAft>
+                <a:spcPts val="400"/>
+              </a:spcAft>
+              <a:defRPr sz="1400">
+                <a:solidFill>
+                  <a:srgbClr val="DCDCDC"/>
+                </a:solidFill>
+              </a:defRPr>
+            </a:pPr>
+            <a:r>
+              <a:t>**Keywords:** Advanced Imaging, OCT, Hyperspectral Imaging, Confocal Endomicroscopy, Deeper AI Integration, Risk Stratification, Personalized Medicine, Optical Engineering, Signal Processing.</a:t>
+            </a:r>
+          </a:p>
+        </p:txBody>
+      </p:sp>
+    </p:spTree>
+  </p:cSld>
+  <p:clrMapOvr>
+    <a:masterClrMapping/>
+  </p:clrMapOvr>
+</p:sld>
+</file>
+
+<file path=ppt/slides/slide17.xml><?xml version="1.0" encoding="utf-8"?>
+<p:sld xmlns:a="http://schemas.openxmlformats.org/drawingml/2006/main" xmlns:p="http://schemas.openxmlformats.org/presentationml/2006/main" xmlns:r="http://schemas.openxmlformats.org/officeDocument/2006/relationships">
+  <p:cSld>
+    <p:bg>
+      <p:bgPr>
+        <a:solidFill>
+          <a:srgbClr val="000000"/>
+        </a:solidFill>
+        <a:effectLst/>
+      </p:bgPr>
+    </p:bg>
+    <p:spTree>
+      <p:nvGrpSpPr>
+        <p:cNvPr id="1" name=""/>
+        <p:cNvGrpSpPr/>
+        <p:nvPr/>
+      </p:nvGrpSpPr>
+      <p:grpSpPr/>
+      <p:sp>
+        <p:nvSpPr>
+          <p:cNvPr id="2" name="TextBox 1"/>
+          <p:cNvSpPr txBox="1"/>
+          <p:nvPr/>
+        </p:nvSpPr>
+        <p:spPr>
+          <a:xfrm>
+            <a:off x="457200" y="182880"/>
+            <a:ext cx="8229600" cy="731520"/>
+          </a:xfrm>
+          <a:prstGeom prst="rect">
+            <a:avLst/>
+          </a:prstGeom>
+          <a:noFill/>
+        </p:spPr>
+        <p:txBody>
+          <a:bodyPr wrap="square">
+            <a:spAutoFit/>
+          </a:bodyPr>
+          <a:lstStyle/>
+          <a:p>
+            <a:pPr>
+              <a:defRPr b="1" sz="2800">
+                <a:solidFill>
+                  <a:srgbClr val="FFFFFF"/>
+                </a:solidFill>
+              </a:defRPr>
+            </a:pPr>
+            <a:r>
+              <a:t>Slide 17: Gelecek Vizyonu: Teranostik ve Tek Kullanımlık Cihazlar</a:t>
+            </a:r>
+          </a:p>
+        </p:txBody>
+      </p:sp>
+      <p:sp>
+        <p:nvSpPr>
+          <p:cNvPr id="3" name="TextBox 2"/>
+          <p:cNvSpPr txBox="1"/>
+          <p:nvPr/>
+        </p:nvSpPr>
+        <p:spPr>
+          <a:xfrm>
+            <a:off x="457200" y="914400"/>
+            <a:ext cx="8229600" cy="5029200"/>
+          </a:xfrm>
+          <a:prstGeom prst="rect">
+            <a:avLst/>
+          </a:prstGeom>
+          <a:noFill/>
+        </p:spPr>
+        <p:txBody>
+          <a:bodyPr wrap="square" anchor="t">
+            <a:spAutoFit/>
+          </a:bodyPr>
+          <a:lstStyle/>
+          <a:p>
+            <a:pPr>
+              <a:spcAft>
+                <a:spcPts val="400"/>
+              </a:spcAft>
+              <a:defRPr sz="1400">
+                <a:solidFill>
+                  <a:srgbClr val="DCDCDC"/>
+                </a:solidFill>
+              </a:defRPr>
+            </a:pPr>
+            <a:r>
+              <a:t>Tedavi ve tanı birleşiyor, enfeksiyon kontrolü öncelik kazanıyor:</a:t>
+            </a:r>
+          </a:p>
+          <a:p>
+            <a:pPr>
+              <a:spcAft>
+                <a:spcPts val="400"/>
+              </a:spcAft>
+              <a:defRPr sz="1400">
+                <a:solidFill>
+                  <a:srgbClr val="DCDCDC"/>
+                </a:solidFill>
+              </a:defRPr>
+            </a:pPr>
+            <a:r>
+              <a:t>  • **Teranostik (Theranostics):** Görüntüleme ile tedaviyi birleştiren yaklaşımlar. Örneğin, lezyonu görüntülerken aynı anda hedefe yönelik ilaç salınımı yapmak veya fotodinamik/termal terapi uygulamak. Mühendislik; ilaç taşıma sistemleri, enerji iletimi ve kontrol mekanizmalarını içerir.</a:t>
+            </a:r>
+          </a:p>
+          <a:p>
+            <a:pPr>
+              <a:spcAft>
+                <a:spcPts val="400"/>
+              </a:spcAft>
+              <a:defRPr sz="1400">
+                <a:solidFill>
+                  <a:srgbClr val="DCDCDC"/>
+                </a:solidFill>
+              </a:defRPr>
+            </a:pPr>
+            <a:r>
+              <a:t>  • **Tek Kullanımlık Endoskoplar:** Özellikle bronkoskopi ve üreteroskopi gibi alanlarda, çapraz kontaminasyon riskini tamamen ortadan kaldırmak ve yeniden işleme maliyetini/zorluğunu azaltmak için geliştirilen cihazlar.</a:t>
+            </a:r>
+          </a:p>
+          <a:p>
+            <a:pPr>
+              <a:spcAft>
+                <a:spcPts val="400"/>
+              </a:spcAft>
+              <a:defRPr sz="1400">
+                <a:solidFill>
+                  <a:srgbClr val="DCDCDC"/>
+                </a:solidFill>
+              </a:defRPr>
+            </a:pPr>
+            <a:r>
+              <a:t>  • **Mühendislik Zorluğu (Tek Kullanımlık):** Performanstan ödün vermeden maliyeti düşürmek. Malzeme seçimi, üretim otomasyonu ve tasarım optimizasyonu kritik.</a:t>
+            </a:r>
+          </a:p>
+          <a:p>
+            <a:pPr>
+              <a:spcAft>
+                <a:spcPts val="400"/>
+              </a:spcAft>
+              <a:defRPr sz="1400">
+                <a:solidFill>
+                  <a:srgbClr val="DCDCDC"/>
+                </a:solidFill>
+              </a:defRPr>
+            </a:pPr>
+            <a:r>
+              <a:t>**Keywords:** Theranostics, Targeted Drug Delivery, Photodynamic Therapy, Disposable Endoscopes, Single-Use Devices, Infection Control, Cost-Effectiveness, Manufacturing Engineering.</a:t>
+            </a:r>
+          </a:p>
+        </p:txBody>
+      </p:sp>
+    </p:spTree>
+  </p:cSld>
+  <p:clrMapOvr>
+    <a:masterClrMapping/>
+  </p:clrMapOvr>
+</p:sld>
+</file>
+
+<file path=ppt/slides/slide18.xml><?xml version="1.0" encoding="utf-8"?>
+<p:sld xmlns:a="http://schemas.openxmlformats.org/drawingml/2006/main" xmlns:p="http://schemas.openxmlformats.org/presentationml/2006/main" xmlns:r="http://schemas.openxmlformats.org/officeDocument/2006/relationships">
+  <p:cSld>
+    <p:bg>
+      <p:bgPr>
+        <a:solidFill>
+          <a:srgbClr val="000000"/>
+        </a:solidFill>
+        <a:effectLst/>
+      </p:bgPr>
+    </p:bg>
+    <p:spTree>
+      <p:nvGrpSpPr>
+        <p:cNvPr id="1" name=""/>
+        <p:cNvGrpSpPr/>
+        <p:nvPr/>
+      </p:nvGrpSpPr>
+      <p:grpSpPr/>
+      <p:sp>
+        <p:nvSpPr>
+          <p:cNvPr id="2" name="TextBox 1"/>
+          <p:cNvSpPr txBox="1"/>
+          <p:nvPr/>
+        </p:nvSpPr>
+        <p:spPr>
+          <a:xfrm>
+            <a:off x="457200" y="182880"/>
+            <a:ext cx="8229600" cy="731520"/>
+          </a:xfrm>
+          <a:prstGeom prst="rect">
+            <a:avLst/>
+          </a:prstGeom>
+          <a:noFill/>
+        </p:spPr>
+        <p:txBody>
+          <a:bodyPr wrap="square">
+            <a:spAutoFit/>
+          </a:bodyPr>
+          <a:lstStyle/>
+          <a:p>
+            <a:pPr>
+              <a:defRPr b="1" sz="2800">
+                <a:solidFill>
+                  <a:srgbClr val="FFFFFF"/>
+                </a:solidFill>
+              </a:defRPr>
+            </a:pPr>
+            <a:r>
+              <a:t>Slide 18: Sonuç: Biyomedikal Mühendisliğinin Sağlıktaki Dönüştürücü Gücü</a:t>
+            </a:r>
+          </a:p>
+        </p:txBody>
+      </p:sp>
+      <p:sp>
+        <p:nvSpPr>
+          <p:cNvPr id="3" name="TextBox 2"/>
+          <p:cNvSpPr txBox="1"/>
+          <p:nvPr/>
+        </p:nvSpPr>
+        <p:spPr>
+          <a:xfrm>
+            <a:off x="457200" y="914400"/>
+            <a:ext cx="8229600" cy="5029200"/>
+          </a:xfrm>
+          <a:prstGeom prst="rect">
+            <a:avLst/>
+          </a:prstGeom>
+          <a:noFill/>
+        </p:spPr>
+        <p:txBody>
+          <a:bodyPr wrap="square" anchor="t">
+            <a:spAutoFit/>
+          </a:bodyPr>
+          <a:lstStyle/>
+          <a:p>
+            <a:pPr>
+              <a:spcAft>
+                <a:spcPts val="400"/>
+              </a:spcAft>
+              <a:defRPr sz="1400">
+                <a:solidFill>
+                  <a:srgbClr val="DCDCDC"/>
+                </a:solidFill>
+              </a:defRPr>
+            </a:pPr>
+            <a:r>
+              <a:t>Endoskopik sistemler, biyomedikal mühendisliğinin temel bilimler ve klinik ihtiyaçlar arasında nasıl bir köprü kurduğunun mükemmel bir örneğidir. Mühendislik prensipleri; daha doğru tanılar, daha az invaziv tedaviler ve daha iyi hasta sonuçları sağlamak için optik, mekanik, malzeme, elektronik, yazılım ve yapay zekayı bir araya getirir. Bu alandaki sürekli yenilikler, hasta bakım standartlarını yükseltmeye ve sağlık hizmetlerini dönüştürmeye devam edecektir.</a:t>
+            </a:r>
+          </a:p>
+          <a:p>
+            <a:pPr>
+              <a:spcAft>
+                <a:spcPts val="400"/>
+              </a:spcAft>
+              <a:defRPr sz="1400">
+                <a:solidFill>
+                  <a:srgbClr val="DCDCDC"/>
+                </a:solidFill>
+              </a:defRPr>
+            </a:pPr>
+            <a:r>
+              <a:t>Teşekkür ederim.</a:t>
+            </a:r>
+          </a:p>
+          <a:p>
+            <a:pPr>
+              <a:spcAft>
+                <a:spcPts val="400"/>
+              </a:spcAft>
+              <a:defRPr sz="1400">
+                <a:solidFill>
+                  <a:srgbClr val="DCDCDC"/>
+                </a:solidFill>
+              </a:defRPr>
+            </a:pPr>
+            <a:r>
+              <a:t>**Keywords:** Biomedical Engineering Impact, Innovation in Healthcare, Diagnosis, Treatment, Patient Outcomes, Interdisciplinary Engineering, Future of Medicine.</a:t>
+            </a:r>
+          </a:p>
+        </p:txBody>
+      </p:sp>
+    </p:spTree>
+  </p:cSld>
+  <p:clrMapOvr>
+    <a:masterClrMapping/>
+  </p:clrMapOvr>
+</p:sld>
+</file>
+
+<file path=ppt/slides/slide19.xml><?xml version="1.0" encoding="utf-8"?>
+<p:sld xmlns:a="http://schemas.openxmlformats.org/drawingml/2006/main" xmlns:p="http://schemas.openxmlformats.org/presentationml/2006/main" xmlns:r="http://schemas.openxmlformats.org/officeDocument/2006/relationships">
+  <p:cSld>
+    <p:bg>
+      <p:bgPr>
+        <a:solidFill>
+          <a:srgbClr val="000000"/>
+        </a:solidFill>
+        <a:effectLst/>
+      </p:bgPr>
+    </p:bg>
+    <p:spTree>
+      <p:nvGrpSpPr>
+        <p:cNvPr id="1" name=""/>
+        <p:cNvGrpSpPr/>
+        <p:nvPr/>
+      </p:nvGrpSpPr>
+      <p:grpSpPr/>
+      <p:sp>
+        <p:nvSpPr>
+          <p:cNvPr id="2" name="TextBox 1"/>
+          <p:cNvSpPr txBox="1"/>
+          <p:nvPr/>
+        </p:nvSpPr>
+        <p:spPr>
+          <a:xfrm>
+            <a:off x="457200" y="182880"/>
+            <a:ext cx="8229600" cy="731520"/>
+          </a:xfrm>
+          <a:prstGeom prst="rect">
+            <a:avLst/>
+          </a:prstGeom>
+          <a:noFill/>
+        </p:spPr>
+        <p:txBody>
+          <a:bodyPr wrap="square">
+            <a:spAutoFit/>
+          </a:bodyPr>
+          <a:lstStyle/>
+          <a:p>
+            <a:pPr>
+              <a:defRPr b="1" sz="2800">
+                <a:solidFill>
+                  <a:srgbClr val="FFFFFF"/>
+                </a:solidFill>
+              </a:defRPr>
+            </a:pPr>
+            <a:r>
               <a:t>Kaynaklar ve Referanslar</a:t>
             </a:r>
           </a:p>
@@ -3734,7 +5359,7 @@
               </a:defRPr>
             </a:pPr>
             <a:r>
-              <a:t>Slide 2: Endoskopik Cihazların Biyomedikal Tasarımı</a:t>
+              <a:t>Slide 2: Biyomedikal Mühendisliğinin Rolü</a:t>
             </a:r>
           </a:p>
         </p:txBody>
@@ -3772,112 +5397,22 @@
               </a:defRPr>
             </a:pPr>
             <a:r>
-              <a:t>Modern bir endoskopik cihazın tasarımı, multidisipliner bir mühendislik yaklaşımı gerektirir. Temel bileşenler şunlardır:</a:t>
-            </a:r>
-          </a:p>
-          <a:p>
-            <a:pPr>
-              <a:spcAft>
-                <a:spcPts val="400"/>
-              </a:spcAft>
-              <a:defRPr sz="1400">
-                <a:solidFill>
-                  <a:srgbClr val="DCDCDC"/>
-                </a:solidFill>
-              </a:defRPr>
-            </a:pPr>
-            <a:r>
-              <a:t>  • **Görüntüleme Sistemi:** Yüksek çözünürlüklü (HD/4K) minyatür CMOS veya CCD sensörler ve lens sistemleri.</a:t>
-            </a:r>
-          </a:p>
-          <a:p>
-            <a:pPr>
-              <a:spcAft>
-                <a:spcPts val="400"/>
-              </a:spcAft>
-              <a:defRPr sz="1400">
-                <a:solidFill>
-                  <a:srgbClr val="DCDCDC"/>
-                </a:solidFill>
-              </a:defRPr>
-            </a:pPr>
-            <a:r>
-              <a:t>  • **Aydınlatma Sistemi:** Cihazın ucuna entegre edilmiş veya fiber optik kablolarla taşınan parlak, soğuk ışık kaynakları (Xenon veya LED).</a:t>
-            </a:r>
-          </a:p>
-          <a:p>
-            <a:pPr>
-              <a:spcAft>
-                <a:spcPts val="400"/>
-              </a:spcAft>
-              <a:defRPr sz="1400">
-                <a:solidFill>
-                  <a:srgbClr val="DCDCDC"/>
-                </a:solidFill>
-              </a:defRPr>
-            </a:pPr>
-            <a:r>
-              <a:t>  • **Esnek Gövde:** Biyouyumlu polimerlerden (örneğin, poliüretan, silikon) yapılmış, farklı sertlik bölgelerine sahip, vücut kıvrımlarına uyum sağlayabilen esnek tüp.</a:t>
-            </a:r>
-          </a:p>
-          <a:p>
-            <a:pPr>
-              <a:spcAft>
-                <a:spcPts val="400"/>
-              </a:spcAft>
-              <a:defRPr sz="1400">
-                <a:solidFill>
-                  <a:srgbClr val="DCDCDC"/>
-                </a:solidFill>
-              </a:defRPr>
-            </a:pPr>
-            <a:r>
-              <a:t>  • **Çalışma Kanalları:** Biyopsi forsepsleri, polipektomi snare'leri gibi aletlerin geçişi, sıvı aspirasyonu veya insüflasyon için tasarlanmış iç kanallar.</a:t>
-            </a:r>
-          </a:p>
-          <a:p>
-            <a:pPr>
-              <a:spcAft>
-                <a:spcPts val="400"/>
-              </a:spcAft>
-              <a:defRPr sz="1400">
-                <a:solidFill>
-                  <a:srgbClr val="DCDCDC"/>
-                </a:solidFill>
-              </a:defRPr>
-            </a:pPr>
-            <a:r>
-              <a:t>  • **Kontrol Mekanizması:** Cihazın distal ucunun hassas şekilde yönlendirilmesini sağlayan mekanik (tellerle) veya bazen elektromekanik sistemler.</a:t>
-            </a:r>
-          </a:p>
-          <a:p>
-            <a:pPr>
-              <a:spcAft>
-                <a:spcPts val="400"/>
-              </a:spcAft>
-              <a:defRPr sz="1400">
-                <a:solidFill>
-                  <a:srgbClr val="DCDCDC"/>
-                </a:solidFill>
-              </a:defRPr>
-            </a:pPr>
-            <a:r>
-              <a:t>Özellikle LED aydınlatma sistemlerinin verimliliği, renk doğruluğu (CRI) ve güç yoğunluğu, biyomedikal mühendislerinin odaklandığı önemli alanlardandır. Pamukkale Üniversitesi'nde yapılan bir yüksek lisans tezinde, endoskopi sistemleri için yüksek verimli bir LED sürücü tasarımı geliştirilmiştir ([Kaynak: İrem Çorak, 2022](https://gcris.pau.edu.tr/bitstream/11499/50937/1/%C4%B0rem%20%C3%87orak.pdf)).</a:t>
-            </a:r>
-          </a:p>
-          <a:p>
-            <a:pPr>
-              <a:spcAft>
-                <a:spcPts val="400"/>
-              </a:spcAft>
-              <a:defRPr sz="1400">
-                <a:solidFill>
-                  <a:srgbClr val="DCDCDC"/>
-                </a:solidFill>
-              </a:defRPr>
-            </a:pPr>
-            <a:r>
-              <a:t>Bu sistemlerin her bir parçasının tasarımı; insan anatomisi, malzeme bilimi, optik, elektronik ve yazılım mühendisliği prensipleriyle birleştirilerek, cihazın hem etkili hem de güvenli olması sağlanır. Ergonomi, sterilizasyona dayanıklılık ve kullanım kolaylığı da tasarımın ayrılmaz parçalarıdır.</a:t>
+              <a:t>Bu sofistike cihazların arkasındaki itici güç biyomedikal mühendisliğidir. Konseptten klinik uygulamaya kadar tüm süreçlerde – tasarım, malzeme seçimi, üretim, test, validasyon ve iyileştirme – mühendislik prensipleri merkezi rol oynar. Hekimlerin ihtiyaçlarını teknolojik çözümlere dönüştürerek daha güvenli, etkili ve kullanıcı dostu cihazlar geliştiririz.</a:t>
+            </a:r>
+          </a:p>
+          <a:p>
+            <a:pPr>
+              <a:spcAft>
+                <a:spcPts val="400"/>
+              </a:spcAft>
+              <a:defRPr sz="1400">
+                <a:solidFill>
+                  <a:srgbClr val="DCDCDC"/>
+                </a:solidFill>
+              </a:defRPr>
+            </a:pPr>
+            <a:r>
+              <a:t>**Keywords:** Biomedical Engineering, Device Design, Innovation, Clinical Needs, Healthcare Technology.</a:t>
             </a:r>
           </a:p>
         </p:txBody>
@@ -3938,7 +5473,7 @@
               </a:defRPr>
             </a:pPr>
             <a:r>
-              <a:t>Slide 3: Kolonoskopi – Klinik Uygulama ve Mühendislik Gereksinimleri</a:t>
+              <a:t>Slide 3: Endoskopik Cihazların Temel Bileşenleri</a:t>
             </a:r>
           </a:p>
         </p:txBody>
@@ -3976,97 +5511,82 @@
               </a:defRPr>
             </a:pPr>
             <a:r>
-              <a:t>Kolonoskopi cihazları, endoskopik sistemlerin en karmaşık örneklerinden biridir. Tipik olarak 130–185 cm uzunluğunda olan bu cihazlar, kalın bağırsağın tamamını (çekuma kadar) incelemek üzere tasarlanmıştır. Distal uç, genellikle dört yöne (yukarı/aşağı, sağ/sol) 180 dereceye kadar bükülebilen, yüksek manevra kabiliyetine sahip bir yapıdadır.</a:t>
-            </a:r>
-          </a:p>
-          <a:p>
-            <a:pPr>
-              <a:spcAft>
-                <a:spcPts val="400"/>
-              </a:spcAft>
-              <a:defRPr sz="1400">
-                <a:solidFill>
-                  <a:srgbClr val="DCDCDC"/>
-                </a:solidFill>
-              </a:defRPr>
-            </a:pPr>
-            <a:r>
-              <a:t>Cihazın temel mühendislik gereksinimleri şunlardır:</a:t>
-            </a:r>
-          </a:p>
-          <a:p>
-            <a:pPr>
-              <a:spcAft>
-                <a:spcPts val="400"/>
-              </a:spcAft>
-              <a:defRPr sz="1400">
-                <a:solidFill>
-                  <a:srgbClr val="DCDCDC"/>
-                </a:solidFill>
-              </a:defRPr>
-            </a:pPr>
-            <a:r>
-              <a:t>  • **İleri İtme ve Yönlendirme:** Bağırsak duvarına zarar vermeden, kıvrımlı anatomide ilerleyebilme yeteneği (itilebilirlik ve tork stabilitesi).</a:t>
-            </a:r>
-          </a:p>
-          <a:p>
-            <a:pPr>
-              <a:spcAft>
-                <a:spcPts val="400"/>
-              </a:spcAft>
-              <a:defRPr sz="1400">
-                <a:solidFill>
-                  <a:srgbClr val="DCDCDC"/>
-                </a:solidFill>
-              </a:defRPr>
-            </a:pPr>
-            <a:r>
-              <a:t>  • **Görüntü Kalitesi:** Yüksek çözünürlük, geniş görüş açısı ve yeterli aydınlatma ile net görüntü sağlama.</a:t>
-            </a:r>
-          </a:p>
-          <a:p>
-            <a:pPr>
-              <a:spcAft>
-                <a:spcPts val="400"/>
-              </a:spcAft>
-              <a:defRPr sz="1400">
-                <a:solidFill>
-                  <a:srgbClr val="DCDCDC"/>
-                </a:solidFill>
-              </a:defRPr>
-            </a:pPr>
-            <a:r>
-              <a:t>  • **Kanal Fonksiyonları:** Hava/CO2 insüflasyonu ile bağırsağı genişletme, su jeti ile lensi temizleme ve biyopsi/tedavi aletlerini etkin kullanma.</a:t>
-            </a:r>
-          </a:p>
-          <a:p>
-            <a:pPr>
-              <a:spcAft>
-                <a:spcPts val="400"/>
-              </a:spcAft>
-              <a:defRPr sz="1400">
-                <a:solidFill>
-                  <a:srgbClr val="DCDCDC"/>
-                </a:solidFill>
-              </a:defRPr>
-            </a:pPr>
-            <a:r>
-              <a:t>  • **Ergonomi ve Kontrol:** Hekimin cihazı rahatça kontrol edebilmesi ve prosedürü yorulmadan tamamlayabilmesi.</a:t>
-            </a:r>
-          </a:p>
-          <a:p>
-            <a:pPr>
-              <a:spcAft>
-                <a:spcPts val="400"/>
-              </a:spcAft>
-              <a:defRPr sz="1400">
-                <a:solidFill>
-                  <a:srgbClr val="DCDCDC"/>
-                </a:solidFill>
-              </a:defRPr>
-            </a:pPr>
-            <a:r>
-              <a:t>Biyomedikal mühendisler, bu gereksinimleri karşılamak için malzeme seçimi (örneğin, değişken sertlikte şaft tasarımı), mekanik tasarım (örneğin, tel tabanlı artikülasyon mekanizmaları) ve optoelektronik entegrasyon konularında optimizasyon yaparlar.</a:t>
+              <a:t>Modern bir endoskopun temel mühendislik bileşenleri şunlardır:</a:t>
+            </a:r>
+          </a:p>
+          <a:p>
+            <a:pPr>
+              <a:spcAft>
+                <a:spcPts val="400"/>
+              </a:spcAft>
+              <a:defRPr sz="1400">
+                <a:solidFill>
+                  <a:srgbClr val="DCDCDC"/>
+                </a:solidFill>
+              </a:defRPr>
+            </a:pPr>
+            <a:r>
+              <a:t>  • **Görüntüleme Sistemi:** Yüksek çözünürlüklü (HD/4K) minyatür CMOS veya CCD sensörler ve optimize edilmiş lens sistemleri. Görüntü kalitesi ve renk doğruluğu kritiktir.</a:t>
+            </a:r>
+          </a:p>
+          <a:p>
+            <a:pPr>
+              <a:spcAft>
+                <a:spcPts val="400"/>
+              </a:spcAft>
+              <a:defRPr sz="1400">
+                <a:solidFill>
+                  <a:srgbClr val="DCDCDC"/>
+                </a:solidFill>
+              </a:defRPr>
+            </a:pPr>
+            <a:r>
+              <a:t>  • **Aydınlatma Sistemi:** Parlak, soğuk ışık sağlayan fiber optik veya giderek yaygınlaşan verimli LED sistemleri. Işık yoğunluğu ve homojenliği önemlidir.</a:t>
+            </a:r>
+          </a:p>
+          <a:p>
+            <a:pPr>
+              <a:spcAft>
+                <a:spcPts val="400"/>
+              </a:spcAft>
+              <a:defRPr sz="1400">
+                <a:solidFill>
+                  <a:srgbClr val="DCDCDC"/>
+                </a:solidFill>
+              </a:defRPr>
+            </a:pPr>
+            <a:r>
+              <a:t>  • **Esnek Gövde:** Biyouyumlu polimerlerden (poliüretan, silikon vb.) yapılmış, vücut anatomisine uyum sağlayan, değişken sertlikte olabilen yapı.</a:t>
+            </a:r>
+          </a:p>
+          <a:p>
+            <a:pPr>
+              <a:spcAft>
+                <a:spcPts val="400"/>
+              </a:spcAft>
+              <a:defRPr sz="1400">
+                <a:solidFill>
+                  <a:srgbClr val="DCDCDC"/>
+                </a:solidFill>
+              </a:defRPr>
+            </a:pPr>
+            <a:r>
+              <a:t>  • **Çalışma Kanalları:** Alet geçişi, sıvı aspirasyonu veya gaz insüflasyonu için tasarlanmış iç lümenler.</a:t>
+            </a:r>
+          </a:p>
+          <a:p>
+            <a:pPr>
+              <a:spcAft>
+                <a:spcPts val="400"/>
+              </a:spcAft>
+              <a:defRPr sz="1400">
+                <a:solidFill>
+                  <a:srgbClr val="DCDCDC"/>
+                </a:solidFill>
+              </a:defRPr>
+            </a:pPr>
+            <a:r>
+              <a:t>**Keywords:** Endoscope Components, Imaging System (CMOS/CCD), Lighting System (LED/Fiber Optic), Flexible Body, Biocompatible Polymers, Working Channels.</a:t>
             </a:r>
           </a:p>
         </p:txBody>
@@ -4127,7 +5647,7 @@
               </a:defRPr>
             </a:pPr>
             <a:r>
-              <a:t>Slide 4: Sterilizasyon, Güvenlik ve Biyouyumluluk</a:t>
+              <a:t>Slide 4: Tasarımda Mühendislik Zorlukları</a:t>
             </a:r>
           </a:p>
         </p:txBody>
@@ -4165,67 +5685,82 @@
               </a:defRPr>
             </a:pPr>
             <a:r>
-              <a:t>Endoskopik cihazlar, steril olmayan vücut boşluklarına girse de, çapraz kontaminasyonu önlemek için her kullanımdan sonra titizlikle temizlenmeli ve yüksek düzeyde dezenfekte edilmeli veya sterilize edilmelidir. Bu nedenle biyouyumluluk ve sterilizasyon süreçlerine dayanıklılık kritik öneme sahiptir.</a:t>
-            </a:r>
-          </a:p>
-          <a:p>
-            <a:pPr>
-              <a:spcAft>
-                <a:spcPts val="400"/>
-              </a:spcAft>
-              <a:defRPr sz="1400">
-                <a:solidFill>
-                  <a:srgbClr val="DCDCDC"/>
-                </a:solidFill>
-              </a:defRPr>
-            </a:pPr>
-            <a:r>
-              <a:t>  • **Biyouyumluluk:** Cihazın hasta dokularıyla temas eden tüm bileşenleri, ISO 10993 standartlarına uygun olarak test edilmiş, toksik veya alerjik reaksiyona neden olmayan tıbbi sınıf malzemelerden yapılmalıdır.</a:t>
-            </a:r>
-          </a:p>
-          <a:p>
-            <a:pPr>
-              <a:spcAft>
-                <a:spcPts val="400"/>
-              </a:spcAft>
-              <a:defRPr sz="1400">
-                <a:solidFill>
-                  <a:srgbClr val="DCDCDC"/>
-                </a:solidFill>
-              </a:defRPr>
-            </a:pPr>
-            <a:r>
-              <a:t>  • **Sterilizasyon/Dezenfeksiyon:** Cihazlar, tekrarlanan temizlik ve yüksek düzey dezenfeksiyon (genellikle kimyasal solüsyonlarla, örn. Glutaraldehit, OPA) veya sterilizasyon (örn. Etilen Oksit (EtO), Hidrojen Peroksit Gaz Plazma, veya bazı durumlarda buhar otoklavı - ISO 17664 gibi standartlara uygun) işlemlerine malzeme bütünlüğünü ve fonksiyonelliğini kaybetmeden dayanabilmelidir.</a:t>
-            </a:r>
-          </a:p>
-          <a:p>
-            <a:pPr>
-              <a:spcAft>
-                <a:spcPts val="400"/>
-              </a:spcAft>
-              <a:defRPr sz="1400">
-                <a:solidFill>
-                  <a:srgbClr val="DCDCDC"/>
-                </a:solidFill>
-              </a:defRPr>
-            </a:pPr>
-            <a:r>
-              <a:t>  • **Elektriksel Güvenlik:** Cihaz içindeki elektronik bileşenler, hasta ve kullanıcı için herhangi bir elektriksel risk oluşturmayacak şekilde (IEC 60601 standartlarına uygun) yalıtılmalı ve tasarlanmalıdır.</a:t>
-            </a:r>
-          </a:p>
-          <a:p>
-            <a:pPr>
-              <a:spcAft>
-                <a:spcPts val="400"/>
-              </a:spcAft>
-              <a:defRPr sz="1400">
-                <a:solidFill>
-                  <a:srgbClr val="DCDCDC"/>
-                </a:solidFill>
-              </a:defRPr>
-            </a:pPr>
-            <a:r>
-              <a:t>Biyomedikal mühendisleri, malzeme seçiminden tasarıma kadar bu gereklilikleri göz önünde bulundurarak, cihazların hem etkili hem de son derece güvenli olmasını sağlar.</a:t>
+              <a:t>Endoskop tasarımı, birçok mühendislik zorluğunu içerir:</a:t>
+            </a:r>
+          </a:p>
+          <a:p>
+            <a:pPr>
+              <a:spcAft>
+                <a:spcPts val="400"/>
+              </a:spcAft>
+              <a:defRPr sz="1400">
+                <a:solidFill>
+                  <a:srgbClr val="DCDCDC"/>
+                </a:solidFill>
+              </a:defRPr>
+            </a:pPr>
+            <a:r>
+              <a:t>  • **Malzeme Bilimi:** Biyouyumluluk, sterilizasyona dayanıklılık, esneklik ve itilebilirlik arasında doğru dengeyi bulmak. Değişken sertlikte şaftlar (örneğin, proksimalde daha sert, distalde daha esnek) itilebilirliği artırır.</a:t>
+            </a:r>
+          </a:p>
+          <a:p>
+            <a:pPr>
+              <a:spcAft>
+                <a:spcPts val="400"/>
+              </a:spcAft>
+              <a:defRPr sz="1400">
+                <a:solidFill>
+                  <a:srgbClr val="DCDCDC"/>
+                </a:solidFill>
+              </a:defRPr>
+            </a:pPr>
+            <a:r>
+              <a:t>  • **Mekanik Tasarım:** Distal ucun hassas ve geniş açılı (genellikle 4 yöne &gt;180°) yönlendirilmesini sağlayan karmaşık tel-makara veya bazen elektromekanik artikülasyon mekanizmaları. Tork stabilitesi önemlidir.</a:t>
+            </a:r>
+          </a:p>
+          <a:p>
+            <a:pPr>
+              <a:spcAft>
+                <a:spcPts val="400"/>
+              </a:spcAft>
+              <a:defRPr sz="1400">
+                <a:solidFill>
+                  <a:srgbClr val="DCDCDC"/>
+                </a:solidFill>
+              </a:defRPr>
+            </a:pPr>
+            <a:r>
+              <a:t>  • **Optoelektronik:** Minyatür kamera ve lenslerin entegrasyonu, LED sürücü devrelerinin verimliliği (ısı yönetimi, güç tüketimi, CRI), sinyal iletimi (parazit azaltma). Pamukkale Üniversitesi'ndeki LED sürücü tezi ([Kaynak: İrem Çorak, 2022](https://gcris.pau.edu.tr/bitstream/11499/50937/1/%C4%B0rem%20%C3%87orak.pdf)) bu alandaki optimizasyon ihtiyacını gösterir.</a:t>
+            </a:r>
+          </a:p>
+          <a:p>
+            <a:pPr>
+              <a:spcAft>
+                <a:spcPts val="400"/>
+              </a:spcAft>
+              <a:defRPr sz="1400">
+                <a:solidFill>
+                  <a:srgbClr val="DCDCDC"/>
+                </a:solidFill>
+              </a:defRPr>
+            </a:pPr>
+            <a:r>
+              <a:t>  • **Ergonomi:** Hekimin cihazı uzun süre yorulmadan kullanabilmesi için kontrol ünitesi tasarımı.</a:t>
+            </a:r>
+          </a:p>
+          <a:p>
+            <a:pPr>
+              <a:spcAft>
+                <a:spcPts val="400"/>
+              </a:spcAft>
+              <a:defRPr sz="1400">
+                <a:solidFill>
+                  <a:srgbClr val="DCDCDC"/>
+                </a:solidFill>
+              </a:defRPr>
+            </a:pPr>
+            <a:r>
+              <a:t>**Keywords:** Engineering Challenges, Material Science, Variable Stiffness, Mechanical Design, Articulation Mechanism, Torque Stability, Optoelectronics, LED Driver, Ergonomics.</a:t>
             </a:r>
           </a:p>
         </p:txBody>
@@ -4286,7 +5821,7 @@
               </a:defRPr>
             </a:pPr>
             <a:r>
-              <a:t>Slide 5: Yapay Zeka ve Yeni Nesil Endoskopik Sistemler</a:t>
+              <a:t>Slide 5: Kolonoskopi: Özel Mühendislik Gereksinimleri</a:t>
             </a:r>
           </a:p>
         </p:txBody>
@@ -4324,82 +5859,67 @@
               </a:defRPr>
             </a:pPr>
             <a:r>
-              <a:t>Endoskopik görüntüleme, yapay zeka (AI) entegrasyonu ile devrim niteliğinde bir dönüşüm yaşamaktadır. AI algoritmaları, gerçek zamanlı olarak endoskopik video akışını analiz ederek hekimlere önemli destek sağlamaktadır:</a:t>
-            </a:r>
-          </a:p>
-          <a:p>
-            <a:pPr>
-              <a:spcAft>
-                <a:spcPts val="400"/>
-              </a:spcAft>
-              <a:defRPr sz="1400">
-                <a:solidFill>
-                  <a:srgbClr val="DCDCDC"/>
-                </a:solidFill>
-              </a:defRPr>
-            </a:pPr>
-            <a:r>
-              <a:t>  • **Bilgisayar Destekli Tespit (CADe):** Özellikle kolon kanserinin öncüsü olan poliplerin gözden kaçırılma oranını azaltmak için geliştirilmiştir. AI, şüpheli lezyonları tespit edip görsel olarak işaretleyebilir.</a:t>
-            </a:r>
-          </a:p>
-          <a:p>
-            <a:pPr>
-              <a:spcAft>
-                <a:spcPts val="400"/>
-              </a:spcAft>
-              <a:defRPr sz="1400">
-                <a:solidFill>
-                  <a:srgbClr val="DCDCDC"/>
-                </a:solidFill>
-              </a:defRPr>
-            </a:pPr>
-            <a:r>
-              <a:t>  • **Bilgisayar Destekli Tanı (CADx):** Tespit edilen lezyonların (örneğin, poliplerin) iyi huylu mu kötü huylu mu olduğunu tahmin etmeye yardımcı olarak, gereksiz biyopsileri azaltabilir.</a:t>
-            </a:r>
-          </a:p>
-          <a:p>
-            <a:pPr>
-              <a:spcAft>
-                <a:spcPts val="400"/>
-              </a:spcAft>
-              <a:defRPr sz="1400">
-                <a:solidFill>
-                  <a:srgbClr val="DCDCDC"/>
-                </a:solidFill>
-              </a:defRPr>
-            </a:pPr>
-            <a:r>
-              <a:t>  • **Görüntü İyileştirme:** Sanal kromoendoskopi (NBI, FICE, i-scan gibi teknolojilere benzer şekilde) veya kontrast artırımı yaparak lezyonların daha belirgin hale gelmesini sağlar.</a:t>
-            </a:r>
-          </a:p>
-          <a:p>
-            <a:pPr>
-              <a:spcAft>
-                <a:spcPts val="400"/>
-              </a:spcAft>
-              <a:defRPr sz="1400">
-                <a:solidFill>
-                  <a:srgbClr val="DCDCDC"/>
-                </a:solidFill>
-              </a:defRPr>
-            </a:pPr>
-            <a:r>
-              <a:t>  • **Kalite Kontrol:** Kolonoskopi sırasında kör noktaların kalıp kalmadığını veya çekuma ulaşılıp ulaşılmadığını takip ederek prosedür kalitesini artırabilir.</a:t>
-            </a:r>
-          </a:p>
-          <a:p>
-            <a:pPr>
-              <a:spcAft>
-                <a:spcPts val="400"/>
-              </a:spcAft>
-              <a:defRPr sz="1400">
-                <a:solidFill>
-                  <a:srgbClr val="DCDCDC"/>
-                </a:solidFill>
-              </a:defRPr>
-            </a:pPr>
-            <a:r>
-              <a:t>Bu teknolojilerin geliştirilmesi; büyük veri setleri üzerinde eğitilmiş derin öğrenme modelleri (özellikle Evrişimli Sinir Ağları - CNN), sinyal işleme teknikleri ve kullanıcı dostu arayüz tasarımlarını içerir. Biyomedikal mühendisliği, bu algoritmaların klinik iş akışına sorunsuz entegrasyonunu sağlar.</a:t>
+              <a:t>Kolonoskoplar (130-185 cm), uzun ve kıvrımlı kolonda ilerlemek için özel mühendislik çözümleri gerektirir:</a:t>
+            </a:r>
+          </a:p>
+          <a:p>
+            <a:pPr>
+              <a:spcAft>
+                <a:spcPts val="400"/>
+              </a:spcAft>
+              <a:defRPr sz="1400">
+                <a:solidFill>
+                  <a:srgbClr val="DCDCDC"/>
+                </a:solidFill>
+              </a:defRPr>
+            </a:pPr>
+            <a:r>
+              <a:t>  • **İtilebilirlik ve Tork Stabilitesi:** Cihazın itme kuvvetini verimli bir şekilde uca iletmesi ve dönme hareketine direnç göstermemesi, bağırsak duvarına zarar vermeden ilerlemeyi sağlar. Değişken sertlikteki şaft tasarımı burada kritiktir.</a:t>
+            </a:r>
+          </a:p>
+          <a:p>
+            <a:pPr>
+              <a:spcAft>
+                <a:spcPts val="400"/>
+              </a:spcAft>
+              <a:defRPr sz="1400">
+                <a:solidFill>
+                  <a:srgbClr val="DCDCDC"/>
+                </a:solidFill>
+              </a:defRPr>
+            </a:pPr>
+            <a:r>
+              <a:t>  • **Yüksek Manevra Kabiliyeti:** Distal ucun geniş açılarla bükülebilmesi, kör noktaları en aza indirir.</a:t>
+            </a:r>
+          </a:p>
+          <a:p>
+            <a:pPr>
+              <a:spcAft>
+                <a:spcPts val="400"/>
+              </a:spcAft>
+              <a:defRPr sz="1400">
+                <a:solidFill>
+                  <a:srgbClr val="DCDCDC"/>
+                </a:solidFill>
+              </a:defRPr>
+            </a:pPr>
+            <a:r>
+              <a:t>  • **Etkin Kanal Fonksiyonları:** Yeterli çapta çalışma kanalları, büyük poliplerin çıkarılmasına olanak tanırken, insüflasyon (görüş alanı için) ve irigasyon (lens temizliği/kanama kontrolü için) kanallarının da verimli çalışması gerekir.</a:t>
+            </a:r>
+          </a:p>
+          <a:p>
+            <a:pPr>
+              <a:spcAft>
+                <a:spcPts val="400"/>
+              </a:spcAft>
+              <a:defRPr sz="1400">
+                <a:solidFill>
+                  <a:srgbClr val="DCDCDC"/>
+                </a:solidFill>
+              </a:defRPr>
+            </a:pPr>
+            <a:r>
+              <a:t>**Keywords:** Colonoscopy Engineering, Pushability, Torque Stability, Maneuverability, Channel Functions, Variable Stiffness Shaft, Clinical Requirements.</a:t>
             </a:r>
           </a:p>
         </p:txBody>
@@ -4460,7 +5980,7 @@
               </a:defRPr>
             </a:pPr>
             <a:r>
-              <a:t>Slide 6: Test ve Kalite Süreçleri</a:t>
+              <a:t>Slide 6: Biyouyumluluk ve Malzeme Seçimi (ISO 10993)</a:t>
             </a:r>
           </a:p>
         </p:txBody>
@@ -4498,112 +6018,67 @@
               </a:defRPr>
             </a:pPr>
             <a:r>
-              <a:t>Endoskopik cihazlar, tıbbi cihaz yönetmelikleri (örneğin, FDA, CE işareti için MDR) uyarınca sıkı test ve kalite kontrol süreçlerinden geçer. Biyomedikal mühendisler, tasarım ve üretim aşamalarında şu gibi testleri planlar ve denetler:</a:t>
-            </a:r>
-          </a:p>
-          <a:p>
-            <a:pPr>
-              <a:spcAft>
-                <a:spcPts val="400"/>
-              </a:spcAft>
-              <a:defRPr sz="1400">
-                <a:solidFill>
-                  <a:srgbClr val="DCDCDC"/>
-                </a:solidFill>
-              </a:defRPr>
-            </a:pPr>
-            <a:r>
-              <a:t>  • **Fonksiyonel Testler:** Görüntü kalitesi (çözünürlük, renk doğruluğu), artikülasyon mekanizmasının hassasiyeti, kanalların bütünlüğü ve akış hızları.</a:t>
-            </a:r>
-          </a:p>
-          <a:p>
-            <a:pPr>
-              <a:spcAft>
-                <a:spcPts val="400"/>
-              </a:spcAft>
-              <a:defRPr sz="1400">
-                <a:solidFill>
-                  <a:srgbClr val="DCDCDC"/>
-                </a:solidFill>
-              </a:defRPr>
-            </a:pPr>
-            <a:r>
-              <a:t>  • **Mekanik Testler:** Malzeme yorgunluğu, bükülme dayanıklılığı, çekme mukavemeti, bağlantı noktalarının sağlamlığı.</a:t>
-            </a:r>
-          </a:p>
-          <a:p>
-            <a:pPr>
-              <a:spcAft>
-                <a:spcPts val="400"/>
-              </a:spcAft>
-              <a:defRPr sz="1400">
-                <a:solidFill>
-                  <a:srgbClr val="DCDCDC"/>
-                </a:solidFill>
-              </a:defRPr>
-            </a:pPr>
-            <a:r>
-              <a:t>  • **Biyouyumluluk ve Toksisite Testleri:** ISO 10993 serisi standartlara göre.</a:t>
-            </a:r>
-          </a:p>
-          <a:p>
-            <a:pPr>
-              <a:spcAft>
-                <a:spcPts val="400"/>
-              </a:spcAft>
-              <a:defRPr sz="1400">
-                <a:solidFill>
-                  <a:srgbClr val="DCDCDC"/>
-                </a:solidFill>
-              </a:defRPr>
-            </a:pPr>
-            <a:r>
-              <a:t>  • **Sterilizasyon Validasyonu:** Seçilen sterilizasyon yönteminin etkinliğinin ve cihaz üzerindeki etkisinin doğrulanması.</a:t>
-            </a:r>
-          </a:p>
-          <a:p>
-            <a:pPr>
-              <a:spcAft>
-                <a:spcPts val="400"/>
-              </a:spcAft>
-              <a:defRPr sz="1400">
-                <a:solidFill>
-                  <a:srgbClr val="DCDCDC"/>
-                </a:solidFill>
-              </a:defRPr>
-            </a:pPr>
-            <a:r>
-              <a:t>  • **Elektriksel Güvenlik Testleri:** IEC 60601 standartlarına göre kaçak akım, yalıtım direnci vb. testler.</a:t>
-            </a:r>
-          </a:p>
-          <a:p>
-            <a:pPr>
-              <a:spcAft>
-                <a:spcPts val="400"/>
-              </a:spcAft>
-              <a:defRPr sz="1400">
-                <a:solidFill>
-                  <a:srgbClr val="DCDCDC"/>
-                </a:solidFill>
-              </a:defRPr>
-            </a:pPr>
-            <a:r>
-              <a:t>  • **Yazılım Validasyonu:** Cihaz yazılımının güvenilirliği ve güvenliği (IEC 62304).</a:t>
-            </a:r>
-          </a:p>
-          <a:p>
-            <a:pPr>
-              <a:spcAft>
-                <a:spcPts val="400"/>
-              </a:spcAft>
-              <a:defRPr sz="1400">
-                <a:solidFill>
-                  <a:srgbClr val="DCDCDC"/>
-                </a:solidFill>
-              </a:defRPr>
-            </a:pPr>
-            <a:r>
-              <a:t>Bu kapsamlı testler, cihazın klinik ortamda güvenli, etkili ve güvenilir bir şekilde çalışmasını garanti altına alır.</a:t>
+              <a:t>Hasta güvenliği için cihazın vücutla temas eden tüm bileşenleri biyouyumlu olmalıdır. Bu, malzemenin toksik, alerjik veya irritan etki göstermemesi anlamına gelir.</a:t>
+            </a:r>
+          </a:p>
+          <a:p>
+            <a:pPr>
+              <a:spcAft>
+                <a:spcPts val="400"/>
+              </a:spcAft>
+              <a:defRPr sz="1400">
+                <a:solidFill>
+                  <a:srgbClr val="DCDCDC"/>
+                </a:solidFill>
+              </a:defRPr>
+            </a:pPr>
+            <a:r>
+              <a:t>  • **Standartlar:** ISO 10993 serisi, biyouyumluluk testleri için uluslararası standarttır. Malzemeler sitotoksisite, sensitizasyon, iritasyon gibi testlerden geçer.</a:t>
+            </a:r>
+          </a:p>
+          <a:p>
+            <a:pPr>
+              <a:spcAft>
+                <a:spcPts val="400"/>
+              </a:spcAft>
+              <a:defRPr sz="1400">
+                <a:solidFill>
+                  <a:srgbClr val="DCDCDC"/>
+                </a:solidFill>
+              </a:defRPr>
+            </a:pPr>
+            <a:r>
+              <a:t>  • **Malzeme Seçimi:** Tıbbi sınıf polimerler (poliüretan, PEEK, silikon), paslanmaz çelikler ve titanyum alaşımları yaygın olarak kullanılır. Seçim, mekanik özellikler, kimyasal direnç ve maliyete göre yapılır.</a:t>
+            </a:r>
+          </a:p>
+          <a:p>
+            <a:pPr>
+              <a:spcAft>
+                <a:spcPts val="400"/>
+              </a:spcAft>
+              <a:defRPr sz="1400">
+                <a:solidFill>
+                  <a:srgbClr val="DCDCDC"/>
+                </a:solidFill>
+              </a:defRPr>
+            </a:pPr>
+            <a:r>
+              <a:t>  • **Mühendislik Rolü:** Doğru malzemeyi seçmek ve üretim süreçlerinin malzemenin biyouyumluluğunu olumsuz etkilemediğinden emin olmak mühendislik sorumluluğudur.</a:t>
+            </a:r>
+          </a:p>
+          <a:p>
+            <a:pPr>
+              <a:spcAft>
+                <a:spcPts val="400"/>
+              </a:spcAft>
+              <a:defRPr sz="1400">
+                <a:solidFill>
+                  <a:srgbClr val="DCDCDC"/>
+                </a:solidFill>
+              </a:defRPr>
+            </a:pPr>
+            <a:r>
+              <a:t>**Keywords:** Biocompatibility, ISO 10993, Material Selection, Medical Grade Polymers, Patient Safety, Cytotoxicity, Sensitization.</a:t>
             </a:r>
           </a:p>
         </p:txBody>
@@ -4664,7 +6139,7 @@
               </a:defRPr>
             </a:pPr>
             <a:r>
-              <a:t>Slide 7: Kullanıcı Geri Bildirimi ile İteratif Geliştirme</a:t>
+              <a:t>Slide 7: Sterilizasyon/Dezenfeksiyon ve Elektriksel Güvenlik</a:t>
             </a:r>
           </a:p>
         </p:txBody>
@@ -4702,82 +6177,67 @@
               </a:defRPr>
             </a:pPr>
             <a:r>
-              <a:t>Endoskopik cihazların tasarımı statik bir süreç değildir. Klinik kullanımdan elde edilen geri bildirimler, sürekli iyileştirme için kritik öneme sahiptir. Biyomedikal mühendisler, hekimler, hemşireler ve teknisyenlerle yakın işbirliği içinde çalışarak:</a:t>
-            </a:r>
-          </a:p>
-          <a:p>
-            <a:pPr>
-              <a:spcAft>
-                <a:spcPts val="400"/>
-              </a:spcAft>
-              <a:defRPr sz="1400">
-                <a:solidFill>
-                  <a:srgbClr val="DCDCDC"/>
-                </a:solidFill>
-              </a:defRPr>
-            </a:pPr>
-            <a:r>
-              <a:t>  • **Ergonomik sorunları** (örneğin, kontrol ünitesinin tutuşu, düğme yerleşimi)</a:t>
-            </a:r>
-          </a:p>
-          <a:p>
-            <a:pPr>
-              <a:spcAft>
-                <a:spcPts val="400"/>
-              </a:spcAft>
-              <a:defRPr sz="1400">
-                <a:solidFill>
-                  <a:srgbClr val="DCDCDC"/>
-                </a:solidFill>
-              </a:defRPr>
-            </a:pPr>
-            <a:r>
-              <a:t>  • **Kullanılabilirlik zorluklarını** (örneğin, aletlerin kanallardan geçişi, yönlendirme hassasiyeti)</a:t>
-            </a:r>
-          </a:p>
-          <a:p>
-            <a:pPr>
-              <a:spcAft>
-                <a:spcPts val="400"/>
-              </a:spcAft>
-              <a:defRPr sz="1400">
-                <a:solidFill>
-                  <a:srgbClr val="DCDCDC"/>
-                </a:solidFill>
-              </a:defRPr>
-            </a:pPr>
-            <a:r>
-              <a:t>  • **Performans eksikliklerini** (örneğin, görüntü kalitesi, aydınlatma yetersizliği)</a:t>
-            </a:r>
-          </a:p>
-          <a:p>
-            <a:pPr>
-              <a:spcAft>
-                <a:spcPts val="400"/>
-              </a:spcAft>
-              <a:defRPr sz="1400">
-                <a:solidFill>
-                  <a:srgbClr val="DCDCDC"/>
-                </a:solidFill>
-              </a:defRPr>
-            </a:pPr>
-            <a:r>
-              <a:t>  • **Dayanıklılık ve bakım sorunlarını** tespit eder.</a:t>
-            </a:r>
-          </a:p>
-          <a:p>
-            <a:pPr>
-              <a:spcAft>
-                <a:spcPts val="400"/>
-              </a:spcAft>
-              <a:defRPr sz="1400">
-                <a:solidFill>
-                  <a:srgbClr val="DCDCDC"/>
-                </a:solidFill>
-              </a:defRPr>
-            </a:pPr>
-            <a:r>
-              <a:t>Bu geri bildirimler, ürün geliştirme döngüsüne dahil edilerek mevcut cihazların güncellenmesi veya yeni nesil cihazların tasarlanması için kullanılır. Bu iteratif yaklaşım, teknolojinin klinik ihtiyaçlara daha iyi yanıt vermesini sağlar.</a:t>
+              <a:t>Tekrar kullanılabilir endoskoplar, çapraz kontaminasyon riskini ortadan kaldırmak için titiz temizlik ve yüksek düzey dezenfeksiyon (HLD) veya sterilizasyon gerektirir.</a:t>
+            </a:r>
+          </a:p>
+          <a:p>
+            <a:pPr>
+              <a:spcAft>
+                <a:spcPts val="400"/>
+              </a:spcAft>
+              <a:defRPr sz="1400">
+                <a:solidFill>
+                  <a:srgbClr val="DCDCDC"/>
+                </a:solidFill>
+              </a:defRPr>
+            </a:pPr>
+            <a:r>
+              <a:t>  • **Zorluklar:** Cihazların karmaşık iç kanalları ve hassas malzemeleri, temizlik ve sterilizasyonu zorlaştırır. Biyofilm oluşumu önemli bir risktir.</a:t>
+            </a:r>
+          </a:p>
+          <a:p>
+            <a:pPr>
+              <a:spcAft>
+                <a:spcPts val="400"/>
+              </a:spcAft>
+              <a:defRPr sz="1400">
+                <a:solidFill>
+                  <a:srgbClr val="DCDCDC"/>
+                </a:solidFill>
+              </a:defRPr>
+            </a:pPr>
+            <a:r>
+              <a:t>  • **Yöntemler ve Dayanıklılık:** Cihazlar, Glutaraldehit, OPA gibi kimyasallarla HLD'ye veya Etilen Oksit (EtO), Hidrojen Peroksit Gaz Plazma gibi sterilizasyon yöntemlerine (ISO 17664 vb.) malzeme bütünlüğü bozulmadan dayanmalıdır. Mühendisler, bu süreçlere uygun malzemeler seçer ve tasarımlar yapar.</a:t>
+            </a:r>
+          </a:p>
+          <a:p>
+            <a:pPr>
+              <a:spcAft>
+                <a:spcPts val="400"/>
+              </a:spcAft>
+              <a:defRPr sz="1400">
+                <a:solidFill>
+                  <a:srgbClr val="DCDCDC"/>
+                </a:solidFill>
+              </a:defRPr>
+            </a:pPr>
+            <a:r>
+              <a:t>  • **Elektriksel Güvenlik (IEC 60601):** Cihaz içindeki elektronik bileşenler, hasta ve kullanıcı için kaçak akım gibi riskler oluşturmamalıdır. İzolasyon ve topraklama kritik öneme sahiptir ve IEC 60601 standartlarına uygunluk test edilir.</a:t>
+            </a:r>
+          </a:p>
+          <a:p>
+            <a:pPr>
+              <a:spcAft>
+                <a:spcPts val="400"/>
+              </a:spcAft>
+              <a:defRPr sz="1400">
+                <a:solidFill>
+                  <a:srgbClr val="DCDCDC"/>
+                </a:solidFill>
+              </a:defRPr>
+            </a:pPr>
+            <a:r>
+              <a:t>**Keywords:** Sterilization, High-Level Disinfection (HLD), Cross-Contamination, Biofilm, EtO, Gas Plasma, ISO 17664, Material Degradation, Electrical Safety, IEC 60601, Leakage Current.</a:t>
             </a:r>
           </a:p>
         </p:txBody>
@@ -4838,7 +6298,7 @@
               </a:defRPr>
             </a:pPr>
             <a:r>
-              <a:t>Slide 8: Taşınabilir ve Kablosuz Sistemler: Kapsül Endoskopi</a:t>
+              <a:t>Slide 8: Yapay Zeka Devrimi: Bilgisayar Destekli Tespit (CADe)</a:t>
             </a:r>
           </a:p>
         </p:txBody>
@@ -4876,82 +6336,67 @@
               </a:defRPr>
             </a:pPr>
             <a:r>
-              <a:t>Geleneksel endoskopinin ulaşamadığı veya hasta için uygun olmadığı durumlar için yenilikçi çözümler geliştirilmiştir. Bunların en bilineni **Kapsül Endoskopi**'dir:</a:t>
-            </a:r>
-          </a:p>
-          <a:p>
-            <a:pPr>
-              <a:spcAft>
-                <a:spcPts val="400"/>
-              </a:spcAft>
-              <a:defRPr sz="1400">
-                <a:solidFill>
-                  <a:srgbClr val="DCDCDC"/>
-                </a:solidFill>
-              </a:defRPr>
-            </a:pPr>
-            <a:r>
-              <a:t>  • **Çalışma Prensibi:** Hasta tarafından yutulan, içinde minyatür kamera, ışık kaynağı (LED), pil ve kablosuz verici bulunan vitamin hapı boyutunda bir kapsüldür.</a:t>
-            </a:r>
-          </a:p>
-          <a:p>
-            <a:pPr>
-              <a:spcAft>
-                <a:spcPts val="400"/>
-              </a:spcAft>
-              <a:defRPr sz="1400">
-                <a:solidFill>
-                  <a:srgbClr val="DCDCDC"/>
-                </a:solidFill>
-              </a:defRPr>
-            </a:pPr>
-            <a:r>
-              <a:t>  • **Uygulama Alanı:** Özellikle ince bağırsağın (geleneksel endoskoplarla erişimi zor olan bölge) görüntülenmesinde yaygın olarak kullanılır.</a:t>
-            </a:r>
-          </a:p>
-          <a:p>
-            <a:pPr>
-              <a:spcAft>
-                <a:spcPts val="400"/>
-              </a:spcAft>
-              <a:defRPr sz="1400">
-                <a:solidFill>
-                  <a:srgbClr val="DCDCDC"/>
-                </a:solidFill>
-              </a:defRPr>
-            </a:pPr>
-            <a:r>
-              <a:t>  • **Teknologi:** Kapsül, sindirim sistemi boyunca ilerlerken saniyede birkaç kare fotoğraf çeker ve bu görüntüleri hastanın üzerinde taşıdığı bir kayıt cihazına kablosuz olarak gönderir.</a:t>
-            </a:r>
-          </a:p>
-          <a:p>
-            <a:pPr>
-              <a:spcAft>
-                <a:spcPts val="400"/>
-              </a:spcAft>
-              <a:defRPr sz="1400">
-                <a:solidFill>
-                  <a:srgbClr val="DCDCDC"/>
-                </a:solidFill>
-              </a:defRPr>
-            </a:pPr>
-            <a:r>
-              <a:t>  • **Mühendislik Zorlukları:** Minyatürleşme, düşük güç tüketimi, kablosuz veri iletimi, biyouyumluluk ve kapsülün vücuttan güvenli atılımı gibi konularda önemli mühendislik çözümleri gerektirir.</a:t>
-            </a:r>
-          </a:p>
-          <a:p>
-            <a:pPr>
-              <a:spcAft>
-                <a:spcPts val="400"/>
-              </a:spcAft>
-              <a:defRPr sz="1400">
-                <a:solidFill>
-                  <a:srgbClr val="DCDCDC"/>
-                </a:solidFill>
-              </a:defRPr>
-            </a:pPr>
-            <a:r>
-              <a:t>Biyomedikal mühendisler, bu tür minimal invaziv ve hasta dostu teknolojileri geliştirerek tanısal yetenekleri genişletmekte ve sağlık hizmetlerine erişimi kolaylaştırmaktadır. Taşınabilir ultrason ve diğer mobil sağlık (mHealth) entegrasyonları da bu alandaki diğer gelişmelerdir.</a:t>
+              <a:t>Yapay zeka (AI), endoskopik görüntülemeyi dönüştürüyor. İlk ve en yaygın uygulama Bilgisayar Destekli Tespit (CADe)'dir.</a:t>
+            </a:r>
+          </a:p>
+          <a:p>
+            <a:pPr>
+              <a:spcAft>
+                <a:spcPts val="400"/>
+              </a:spcAft>
+              <a:defRPr sz="1400">
+                <a:solidFill>
+                  <a:srgbClr val="DCDCDC"/>
+                </a:solidFill>
+              </a:defRPr>
+            </a:pPr>
+            <a:r>
+              <a:t>  • **Amaç:** Özellikle kolonoskopide gözden kaçabilecek küçük veya düz polipler gibi lezyonları gerçek zamanlı olarak tespit etmek ve hekimin dikkatine sunmak (genellikle ekranda bir kutu ile işaretleyerek).</a:t>
+            </a:r>
+          </a:p>
+          <a:p>
+            <a:pPr>
+              <a:spcAft>
+                <a:spcPts val="400"/>
+              </a:spcAft>
+              <a:defRPr sz="1400">
+                <a:solidFill>
+                  <a:srgbClr val="DCDCDC"/>
+                </a:solidFill>
+              </a:defRPr>
+            </a:pPr>
+            <a:r>
+              <a:t>  • **Teknoloji:** Genellikle Evrişimli Sinir Ağları (Convolutional Neural Networks - CNN) tabanlı derin öğrenme modelleri kullanılır. Bu modeller, binlerce etiketlenmiş endoskopi görüntüsüyle eğitilir.</a:t>
+            </a:r>
+          </a:p>
+          <a:p>
+            <a:pPr>
+              <a:spcAft>
+                <a:spcPts val="400"/>
+              </a:spcAft>
+              <a:defRPr sz="1400">
+                <a:solidFill>
+                  <a:srgbClr val="DCDCDC"/>
+                </a:solidFill>
+              </a:defRPr>
+            </a:pPr>
+            <a:r>
+              <a:t>  • **Fayda:** Polip tespit oranını (ADR - Adenoma Detection Rate) artırarak kolorektal kanser önleme potansiyelini yükseltir. Gözden kaçırma oranlarını azaltır.</a:t>
+            </a:r>
+          </a:p>
+          <a:p>
+            <a:pPr>
+              <a:spcAft>
+                <a:spcPts val="400"/>
+              </a:spcAft>
+              <a:defRPr sz="1400">
+                <a:solidFill>
+                  <a:srgbClr val="DCDCDC"/>
+                </a:solidFill>
+              </a:defRPr>
+            </a:pPr>
+            <a:r>
+              <a:t>**Keywords:** Artificial Intelligence (AI), Computer-Aided Detection (CADe), Polyp Detection, Deep Learning, Convolutional Neural Networks (CNN), Adenoma Detection Rate (ADR), Real-Time Analysis.</a:t>
             </a:r>
           </a:p>
         </p:txBody>
@@ -5012,7 +6457,7 @@
               </a:defRPr>
             </a:pPr>
             <a:r>
-              <a:t>Slide 9: Gelecekte Bizi Neler Bekliyor?</a:t>
+              <a:t>Slide 9: Yapay Zeka Devrimi: Bilgisayar Destekli Tanı (CADx) ve Ötesi</a:t>
             </a:r>
           </a:p>
         </p:txBody>
@@ -5050,97 +6495,67 @@
               </a:defRPr>
             </a:pPr>
             <a:r>
-              <a:t>Endoskopik teknolojilerin geleceği heyecan verici yeniliklerle doludur:</a:t>
-            </a:r>
-          </a:p>
-          <a:p>
-            <a:pPr>
-              <a:spcAft>
-                <a:spcPts val="400"/>
-              </a:spcAft>
-              <a:defRPr sz="1400">
-                <a:solidFill>
-                  <a:srgbClr val="DCDCDC"/>
-                </a:solidFill>
-              </a:defRPr>
-            </a:pPr>
-            <a:r>
-              <a:t>  • **Robotik Endoskopi:** Daha hassas yönlendirme, stabilizasyon ve hatta robotik kollarla cerrahi müdahale imkanı sunan sistemler (örneğin, manyetik yönlendirmeli kapsüller, esnek robotik platformlar). Boğaziçi Üniversitesi'nin ağrısız ve hızlı kolonoskopi için robot geliştirme projesi bu alana bir örnektir ([Kaynak](https://haberler.bogazici.edu.tr/tr/haber/bogazici-universitesi-agrisiz-ve-hizli-kolonoskopi-icin-robot-gelistiriyor)).</a:t>
-            </a:r>
-          </a:p>
-          <a:p>
-            <a:pPr>
-              <a:spcAft>
-                <a:spcPts val="400"/>
-              </a:spcAft>
-              <a:defRPr sz="1400">
-                <a:solidFill>
-                  <a:srgbClr val="DCDCDC"/>
-                </a:solidFill>
-              </a:defRPr>
-            </a:pPr>
-            <a:r>
-              <a:t>  • **Gelişmiş Görüntüleme:** Hiperspektral görüntüleme, optik koherens tomografi (OCT) entegrasyonu gibi tekniklerle doku hakkında daha detaylı moleküler ve yapısal bilgi elde etme.</a:t>
-            </a:r>
-          </a:p>
-          <a:p>
-            <a:pPr>
-              <a:spcAft>
-                <a:spcPts val="400"/>
-              </a:spcAft>
-              <a:defRPr sz="1400">
-                <a:solidFill>
-                  <a:srgbClr val="DCDCDC"/>
-                </a:solidFill>
-              </a:defRPr>
-            </a:pPr>
-            <a:r>
-              <a:t>  • **AI ile Derin Entegrasyon:** Tanısal doğruluğu artırmanın ötesinde, prosedür planlama, risk tahmini ve kişiselleştirilmiş tedavi önerileri sunma.</a:t>
-            </a:r>
-          </a:p>
-          <a:p>
-            <a:pPr>
-              <a:spcAft>
-                <a:spcPts val="400"/>
-              </a:spcAft>
-              <a:defRPr sz="1400">
-                <a:solidFill>
-                  <a:srgbClr val="DCDCDC"/>
-                </a:solidFill>
-              </a:defRPr>
-            </a:pPr>
-            <a:r>
-              <a:t>  • **Teranostik Yaklaşımlar:** Görüntüleme ile eş zamanlı olarak hedefe yönelik ilaç salınımı veya tedavi uygulama (örneğin, fotodinamik terapi).</a:t>
-            </a:r>
-          </a:p>
-          <a:p>
-            <a:pPr>
-              <a:spcAft>
-                <a:spcPts val="400"/>
-              </a:spcAft>
-              <a:defRPr sz="1400">
-                <a:solidFill>
-                  <a:srgbClr val="DCDCDC"/>
-                </a:solidFill>
-              </a:defRPr>
-            </a:pPr>
-            <a:r>
-              <a:t>  • **Tek Kullanımlık Endoskoplar:** Özellikle enfeksiyon kontrolü riskini azaltmak için geliştirilen maliyet etkin tek kullanımlık cihazların yaygınlaşması.</a:t>
-            </a:r>
-          </a:p>
-          <a:p>
-            <a:pPr>
-              <a:spcAft>
-                <a:spcPts val="400"/>
-              </a:spcAft>
-              <a:defRPr sz="1400">
-                <a:solidFill>
-                  <a:srgbClr val="DCDCDC"/>
-                </a:solidFill>
-              </a:defRPr>
-            </a:pPr>
-            <a:r>
-              <a:t>Biyomedikal mühendisliği, bu vizyonları gerçeğe dönüştürmek için malzeme bilimi, robotik, yapay zeka, optik ve klinik tıp alanlarını bir araya getiren itici güç olmaya devam edecektir.</a:t>
+              <a:t>AI'nın yetenekleri tespitin ötesine geçiyor:</a:t>
+            </a:r>
+          </a:p>
+          <a:p>
+            <a:pPr>
+              <a:spcAft>
+                <a:spcPts val="400"/>
+              </a:spcAft>
+              <a:defRPr sz="1400">
+                <a:solidFill>
+                  <a:srgbClr val="DCDCDC"/>
+                </a:solidFill>
+              </a:defRPr>
+            </a:pPr>
+            <a:r>
+              <a:t>  • **Bilgisayar Destekli Tanı (CADx):** Tespit edilen lezyonun (örn. polip) türünü (hiperplastik, adenomatöz vb.) veya kanser riskini tahmin etmeye çalışır. Bu, gereksiz biyopsileri veya rezeksiyonları azaltabilir ("optik biyopsi"ye doğru bir adım).</a:t>
+            </a:r>
+          </a:p>
+          <a:p>
+            <a:pPr>
+              <a:spcAft>
+                <a:spcPts val="400"/>
+              </a:spcAft>
+              <a:defRPr sz="1400">
+                <a:solidFill>
+                  <a:srgbClr val="DCDCDC"/>
+                </a:solidFill>
+              </a:defRPr>
+            </a:pPr>
+            <a:r>
+              <a:t>  • **Görüntü İyileştirme:** AI, sanal kromoendoskopi benzeri algoritmalarla veya gürültü azaltma ile görüntü kalitesini artırabilir.</a:t>
+            </a:r>
+          </a:p>
+          <a:p>
+            <a:pPr>
+              <a:spcAft>
+                <a:spcPts val="400"/>
+              </a:spcAft>
+              <a:defRPr sz="1400">
+                <a:solidFill>
+                  <a:srgbClr val="DCDCDC"/>
+                </a:solidFill>
+              </a:defRPr>
+            </a:pPr>
+            <a:r>
+              <a:t>  • **Kalite Kontrol:** Prosedür sırasında çekilme hızını, incelenen alan yüzdesini veya kör noktaları takip ederek kolonoskopi kalitesini objektif olarak değerlendirebilir. Çekuma ulaşılıp ulaşılmadığını teyit edebilir.</a:t>
+            </a:r>
+          </a:p>
+          <a:p>
+            <a:pPr>
+              <a:spcAft>
+                <a:spcPts val="400"/>
+              </a:spcAft>
+              <a:defRPr sz="1400">
+                <a:solidFill>
+                  <a:srgbClr val="DCDCDC"/>
+                </a:solidFill>
+              </a:defRPr>
+            </a:pPr>
+            <a:r>
+              <a:t>**Keywords:** Computer-Aided Diagnosis (CADx), Lesion Classification, Optical Biopsy, Image Enhancement, Quality Control, Procedure Metrics, AI Applications.</a:t>
             </a:r>
           </a:p>
         </p:txBody>

</xml_diff>